<commit_message>
remove "timechop" + capitalize "AS"
</commit_message>
<xml_diff>
--- a/curriculum/3_modeling_and_machine_learning/temporal-cross-validation/temporal_cross_validation_slides.pptx
+++ b/curriculum/3_modeling_and_machine_learning/temporal-cross-validation/temporal_cross_validation_slides.pptx
@@ -291,7 +291,7 @@
   </p:defaultTextStyle>
   <p:extLst>
     <p:ext uri="{EFAFB233-063F-42B5-8137-9DF3F51BA10A}">
-      <p15:sldGuideLst xmlns:p15="http://schemas.microsoft.com/office/powerpoint/2012/main" xmlns:p14="http://schemas.microsoft.com/office/powerpoint/2010/main" xmlns:com="http://schemas.openxmlformats.org/drawingml/2006/compatibility" xmlns:pvml="urn:schemas-microsoft-com:office:powerpoint" xmlns:v="urn:schemas-microsoft-com:vml" xmlns:o="urn:schemas-microsoft-com:office:office" xmlns:dgm="http://schemas.openxmlformats.org/drawingml/2006/diagram" xmlns:c="http://schemas.openxmlformats.org/drawingml/2006/chart" xmlns:mv="urn:schemas-microsoft-com:mac:vml" xmlns:mc="http://schemas.openxmlformats.org/markup-compatibility/2006" xmlns="">
+      <p15:sldGuideLst xmlns="" xmlns:mc="http://schemas.openxmlformats.org/markup-compatibility/2006" xmlns:mv="urn:schemas-microsoft-com:mac:vml" xmlns:c="http://schemas.openxmlformats.org/drawingml/2006/chart" xmlns:dgm="http://schemas.openxmlformats.org/drawingml/2006/diagram" xmlns:o="urn:schemas-microsoft-com:office:office" xmlns:v="urn:schemas-microsoft-com:vml" xmlns:pvml="urn:schemas-microsoft-com:office:powerpoint" xmlns:com="http://schemas.openxmlformats.org/drawingml/2006/compatibility" xmlns:p14="http://schemas.microsoft.com/office/powerpoint/2010/main" xmlns:p15="http://schemas.microsoft.com/office/powerpoint/2012/main">
         <p15:guide id="1" orient="horz" pos="1620">
           <p15:clr>
             <a:srgbClr val="A4A3A4"/>
@@ -6026,11 +6026,11 @@
 </file>
 
 <file path=ppt/slideLayouts/slideLayout10.xml><?xml version="1.0" encoding="utf-8"?>
-<p:sldLayout xmlns:a="http://schemas.openxmlformats.org/drawingml/2006/main" xmlns:r="http://schemas.openxmlformats.org/officeDocument/2006/relationships" xmlns:p="http://schemas.openxmlformats.org/presentationml/2006/main" matchingName="Big number">
-  <p:cSld name="BIG_NUMBER">
+<p:sldLayout xmlns:a="http://schemas.openxmlformats.org/drawingml/2006/main" xmlns:r="http://schemas.openxmlformats.org/officeDocument/2006/relationships" xmlns:p="http://schemas.openxmlformats.org/presentationml/2006/main" matchingName="Blank" type="blank">
+  <p:cSld name="BLANK">
     <p:spTree>
       <p:nvGrpSpPr>
-        <p:cNvPr id="1" name="Shape 44"/>
+        <p:cNvPr id="1" name="Shape 48"/>
         <p:cNvGrpSpPr/>
         <p:nvPr/>
       </p:nvGrpSpPr>
@@ -6044,263 +6044,7 @@
       </p:grpSpPr>
       <p:sp>
         <p:nvSpPr>
-          <p:cNvPr id="45" name="Shape 45"/>
-          <p:cNvSpPr txBox="1">
-            <a:spLocks noGrp="1"/>
-          </p:cNvSpPr>
-          <p:nvPr>
-            <p:ph type="title" hasCustomPrompt="1"/>
-          </p:nvPr>
-        </p:nvSpPr>
-        <p:spPr>
-          <a:xfrm>
-            <a:off x="311700" y="1106125"/>
-            <a:ext cx="8520600" cy="1963500"/>
-          </a:xfrm>
-          <a:prstGeom prst="rect">
-            <a:avLst/>
-          </a:prstGeom>
-        </p:spPr>
-        <p:txBody>
-          <a:bodyPr spcFirstLastPara="1" wrap="square" lIns="91425" tIns="91425" rIns="91425" bIns="91425" anchor="b" anchorCtr="0"/>
-          <a:lstStyle>
-            <a:lvl1pPr lvl="0" algn="ctr">
-              <a:spcBef>
-                <a:spcPts val="0"/>
-              </a:spcBef>
-              <a:spcAft>
-                <a:spcPts val="0"/>
-              </a:spcAft>
-              <a:buSzPts val="12000"/>
-              <a:buNone/>
-              <a:defRPr sz="12000"/>
-            </a:lvl1pPr>
-            <a:lvl2pPr lvl="1" algn="ctr">
-              <a:spcBef>
-                <a:spcPts val="0"/>
-              </a:spcBef>
-              <a:spcAft>
-                <a:spcPts val="0"/>
-              </a:spcAft>
-              <a:buSzPts val="12000"/>
-              <a:buNone/>
-              <a:defRPr sz="12000"/>
-            </a:lvl2pPr>
-            <a:lvl3pPr lvl="2" algn="ctr">
-              <a:spcBef>
-                <a:spcPts val="0"/>
-              </a:spcBef>
-              <a:spcAft>
-                <a:spcPts val="0"/>
-              </a:spcAft>
-              <a:buSzPts val="12000"/>
-              <a:buNone/>
-              <a:defRPr sz="12000"/>
-            </a:lvl3pPr>
-            <a:lvl4pPr lvl="3" algn="ctr">
-              <a:spcBef>
-                <a:spcPts val="0"/>
-              </a:spcBef>
-              <a:spcAft>
-                <a:spcPts val="0"/>
-              </a:spcAft>
-              <a:buSzPts val="12000"/>
-              <a:buNone/>
-              <a:defRPr sz="12000"/>
-            </a:lvl4pPr>
-            <a:lvl5pPr lvl="4" algn="ctr">
-              <a:spcBef>
-                <a:spcPts val="0"/>
-              </a:spcBef>
-              <a:spcAft>
-                <a:spcPts val="0"/>
-              </a:spcAft>
-              <a:buSzPts val="12000"/>
-              <a:buNone/>
-              <a:defRPr sz="12000"/>
-            </a:lvl5pPr>
-            <a:lvl6pPr lvl="5" algn="ctr">
-              <a:spcBef>
-                <a:spcPts val="0"/>
-              </a:spcBef>
-              <a:spcAft>
-                <a:spcPts val="0"/>
-              </a:spcAft>
-              <a:buSzPts val="12000"/>
-              <a:buNone/>
-              <a:defRPr sz="12000"/>
-            </a:lvl6pPr>
-            <a:lvl7pPr lvl="6" algn="ctr">
-              <a:spcBef>
-                <a:spcPts val="0"/>
-              </a:spcBef>
-              <a:spcAft>
-                <a:spcPts val="0"/>
-              </a:spcAft>
-              <a:buSzPts val="12000"/>
-              <a:buNone/>
-              <a:defRPr sz="12000"/>
-            </a:lvl7pPr>
-            <a:lvl8pPr lvl="7" algn="ctr">
-              <a:spcBef>
-                <a:spcPts val="0"/>
-              </a:spcBef>
-              <a:spcAft>
-                <a:spcPts val="0"/>
-              </a:spcAft>
-              <a:buSzPts val="12000"/>
-              <a:buNone/>
-              <a:defRPr sz="12000"/>
-            </a:lvl8pPr>
-            <a:lvl9pPr lvl="8" algn="ctr">
-              <a:spcBef>
-                <a:spcPts val="0"/>
-              </a:spcBef>
-              <a:spcAft>
-                <a:spcPts val="0"/>
-              </a:spcAft>
-              <a:buSzPts val="12000"/>
-              <a:buNone/>
-              <a:defRPr sz="12000"/>
-            </a:lvl9pPr>
-          </a:lstStyle>
-          <a:p>
-            <a:r>
-              <a:t>xx%</a:t>
-            </a:r>
-          </a:p>
-        </p:txBody>
-      </p:sp>
-      <p:sp>
-        <p:nvSpPr>
-          <p:cNvPr id="46" name="Shape 46"/>
-          <p:cNvSpPr txBox="1">
-            <a:spLocks noGrp="1"/>
-          </p:cNvSpPr>
-          <p:nvPr>
-            <p:ph type="body" idx="1"/>
-          </p:nvPr>
-        </p:nvSpPr>
-        <p:spPr>
-          <a:xfrm>
-            <a:off x="311700" y="3152225"/>
-            <a:ext cx="8520600" cy="1300800"/>
-          </a:xfrm>
-          <a:prstGeom prst="rect">
-            <a:avLst/>
-          </a:prstGeom>
-        </p:spPr>
-        <p:txBody>
-          <a:bodyPr spcFirstLastPara="1" wrap="square" lIns="91425" tIns="91425" rIns="91425" bIns="91425" anchor="t" anchorCtr="0"/>
-          <a:lstStyle>
-            <a:lvl1pPr marL="457200" lvl="0" indent="-342900" algn="ctr">
-              <a:spcBef>
-                <a:spcPts val="0"/>
-              </a:spcBef>
-              <a:spcAft>
-                <a:spcPts val="0"/>
-              </a:spcAft>
-              <a:buSzPts val="1800"/>
-              <a:buChar char="●"/>
-              <a:defRPr/>
-            </a:lvl1pPr>
-            <a:lvl2pPr marL="914400" lvl="1" indent="-317500" algn="ctr">
-              <a:spcBef>
-                <a:spcPts val="1600"/>
-              </a:spcBef>
-              <a:spcAft>
-                <a:spcPts val="0"/>
-              </a:spcAft>
-              <a:buSzPts val="1400"/>
-              <a:buChar char="○"/>
-              <a:defRPr/>
-            </a:lvl2pPr>
-            <a:lvl3pPr marL="1371600" lvl="2" indent="-317500" algn="ctr">
-              <a:spcBef>
-                <a:spcPts val="1600"/>
-              </a:spcBef>
-              <a:spcAft>
-                <a:spcPts val="0"/>
-              </a:spcAft>
-              <a:buSzPts val="1400"/>
-              <a:buChar char="■"/>
-              <a:defRPr/>
-            </a:lvl3pPr>
-            <a:lvl4pPr marL="1828800" lvl="3" indent="-317500" algn="ctr">
-              <a:spcBef>
-                <a:spcPts val="1600"/>
-              </a:spcBef>
-              <a:spcAft>
-                <a:spcPts val="0"/>
-              </a:spcAft>
-              <a:buSzPts val="1400"/>
-              <a:buChar char="●"/>
-              <a:defRPr/>
-            </a:lvl4pPr>
-            <a:lvl5pPr marL="2286000" lvl="4" indent="-317500" algn="ctr">
-              <a:spcBef>
-                <a:spcPts val="1600"/>
-              </a:spcBef>
-              <a:spcAft>
-                <a:spcPts val="0"/>
-              </a:spcAft>
-              <a:buSzPts val="1400"/>
-              <a:buChar char="○"/>
-              <a:defRPr/>
-            </a:lvl5pPr>
-            <a:lvl6pPr marL="2743200" lvl="5" indent="-317500" algn="ctr">
-              <a:spcBef>
-                <a:spcPts val="1600"/>
-              </a:spcBef>
-              <a:spcAft>
-                <a:spcPts val="0"/>
-              </a:spcAft>
-              <a:buSzPts val="1400"/>
-              <a:buChar char="■"/>
-              <a:defRPr/>
-            </a:lvl6pPr>
-            <a:lvl7pPr marL="3200400" lvl="6" indent="-317500" algn="ctr">
-              <a:spcBef>
-                <a:spcPts val="1600"/>
-              </a:spcBef>
-              <a:spcAft>
-                <a:spcPts val="0"/>
-              </a:spcAft>
-              <a:buSzPts val="1400"/>
-              <a:buChar char="●"/>
-              <a:defRPr/>
-            </a:lvl7pPr>
-            <a:lvl8pPr marL="3657600" lvl="7" indent="-317500" algn="ctr">
-              <a:spcBef>
-                <a:spcPts val="1600"/>
-              </a:spcBef>
-              <a:spcAft>
-                <a:spcPts val="0"/>
-              </a:spcAft>
-              <a:buSzPts val="1400"/>
-              <a:buChar char="○"/>
-              <a:defRPr/>
-            </a:lvl8pPr>
-            <a:lvl9pPr marL="4114800" lvl="8" indent="-317500" algn="ctr">
-              <a:spcBef>
-                <a:spcPts val="1600"/>
-              </a:spcBef>
-              <a:spcAft>
-                <a:spcPts val="1600"/>
-              </a:spcAft>
-              <a:buSzPts val="1400"/>
-              <a:buChar char="■"/>
-              <a:defRPr/>
-            </a:lvl9pPr>
-          </a:lstStyle>
-          <a:p>
-            <a:endParaRPr/>
-          </a:p>
-        </p:txBody>
-      </p:sp>
-      <p:sp>
-        <p:nvSpPr>
-          <p:cNvPr id="47" name="Shape 47"/>
+          <p:cNvPr id="49" name="Shape 49"/>
           <p:cNvSpPr txBox="1">
             <a:spLocks noGrp="1"/>
           </p:cNvSpPr>
@@ -6385,342 +6129,7 @@
 </p:sldLayout>
 </file>
 
-<file path=ppt/slideLayouts/slideLayout11.xml><?xml version="1.0" encoding="utf-8"?>
-<p:sldLayout xmlns:a="http://schemas.openxmlformats.org/drawingml/2006/main" xmlns:r="http://schemas.openxmlformats.org/officeDocument/2006/relationships" xmlns:p="http://schemas.openxmlformats.org/presentationml/2006/main" matchingName="Blank" type="blank">
-  <p:cSld name="BLANK">
-    <p:spTree>
-      <p:nvGrpSpPr>
-        <p:cNvPr id="1" name="Shape 48"/>
-        <p:cNvGrpSpPr/>
-        <p:nvPr/>
-      </p:nvGrpSpPr>
-      <p:grpSpPr>
-        <a:xfrm>
-          <a:off x="0" y="0"/>
-          <a:ext cx="0" cy="0"/>
-          <a:chOff x="0" y="0"/>
-          <a:chExt cx="0" cy="0"/>
-        </a:xfrm>
-      </p:grpSpPr>
-      <p:sp>
-        <p:nvSpPr>
-          <p:cNvPr id="49" name="Shape 49"/>
-          <p:cNvSpPr txBox="1">
-            <a:spLocks noGrp="1"/>
-          </p:cNvSpPr>
-          <p:nvPr>
-            <p:ph type="sldNum" idx="12"/>
-          </p:nvPr>
-        </p:nvSpPr>
-        <p:spPr>
-          <a:xfrm>
-            <a:off x="8472458" y="4663217"/>
-            <a:ext cx="548700" cy="393600"/>
-          </a:xfrm>
-          <a:prstGeom prst="rect">
-            <a:avLst/>
-          </a:prstGeom>
-        </p:spPr>
-        <p:txBody>
-          <a:bodyPr spcFirstLastPara="1" wrap="square" lIns="91425" tIns="91425" rIns="91425" bIns="91425" anchor="ctr" anchorCtr="0">
-            <a:noAutofit/>
-          </a:bodyPr>
-          <a:lstStyle>
-            <a:lvl1pPr lvl="0">
-              <a:buNone/>
-              <a:defRPr/>
-            </a:lvl1pPr>
-            <a:lvl2pPr lvl="1">
-              <a:buNone/>
-              <a:defRPr/>
-            </a:lvl2pPr>
-            <a:lvl3pPr lvl="2">
-              <a:buNone/>
-              <a:defRPr/>
-            </a:lvl3pPr>
-            <a:lvl4pPr lvl="3">
-              <a:buNone/>
-              <a:defRPr/>
-            </a:lvl4pPr>
-            <a:lvl5pPr lvl="4">
-              <a:buNone/>
-              <a:defRPr/>
-            </a:lvl5pPr>
-            <a:lvl6pPr lvl="5">
-              <a:buNone/>
-              <a:defRPr/>
-            </a:lvl6pPr>
-            <a:lvl7pPr lvl="6">
-              <a:buNone/>
-              <a:defRPr/>
-            </a:lvl7pPr>
-            <a:lvl8pPr lvl="7">
-              <a:buNone/>
-              <a:defRPr/>
-            </a:lvl8pPr>
-            <a:lvl9pPr lvl="8">
-              <a:buNone/>
-              <a:defRPr/>
-            </a:lvl9pPr>
-          </a:lstStyle>
-          <a:p>
-            <a:pPr marL="0" lvl="0" indent="0">
-              <a:spcBef>
-                <a:spcPts val="0"/>
-              </a:spcBef>
-              <a:spcAft>
-                <a:spcPts val="0"/>
-              </a:spcAft>
-              <a:buNone/>
-            </a:pPr>
-            <a:fld id="{00000000-1234-1234-1234-123412341234}" type="slidenum">
-              <a:rPr lang="en"/>
-              <a:t>‹#›</a:t>
-            </a:fld>
-            <a:endParaRPr/>
-          </a:p>
-        </p:txBody>
-      </p:sp>
-    </p:spTree>
-  </p:cSld>
-  <p:clrMapOvr>
-    <a:masterClrMapping/>
-  </p:clrMapOvr>
-</p:sldLayout>
-</file>
-
 <file path=ppt/slideLayouts/slideLayout2.xml><?xml version="1.0" encoding="utf-8"?>
-<p:sldLayout xmlns:a="http://schemas.openxmlformats.org/drawingml/2006/main" xmlns:r="http://schemas.openxmlformats.org/officeDocument/2006/relationships" xmlns:p="http://schemas.openxmlformats.org/presentationml/2006/main" matchingName="Section header" type="secHead">
-  <p:cSld name="SECTION_HEADER">
-    <p:spTree>
-      <p:nvGrpSpPr>
-        <p:cNvPr id="1" name="Shape 13"/>
-        <p:cNvGrpSpPr/>
-        <p:nvPr/>
-      </p:nvGrpSpPr>
-      <p:grpSpPr>
-        <a:xfrm>
-          <a:off x="0" y="0"/>
-          <a:ext cx="0" cy="0"/>
-          <a:chOff x="0" y="0"/>
-          <a:chExt cx="0" cy="0"/>
-        </a:xfrm>
-      </p:grpSpPr>
-      <p:sp>
-        <p:nvSpPr>
-          <p:cNvPr id="14" name="Shape 14"/>
-          <p:cNvSpPr txBox="1">
-            <a:spLocks noGrp="1"/>
-          </p:cNvSpPr>
-          <p:nvPr>
-            <p:ph type="title"/>
-          </p:nvPr>
-        </p:nvSpPr>
-        <p:spPr>
-          <a:xfrm>
-            <a:off x="311700" y="2150850"/>
-            <a:ext cx="8520600" cy="841800"/>
-          </a:xfrm>
-          <a:prstGeom prst="rect">
-            <a:avLst/>
-          </a:prstGeom>
-        </p:spPr>
-        <p:txBody>
-          <a:bodyPr spcFirstLastPara="1" wrap="square" lIns="91425" tIns="91425" rIns="91425" bIns="91425" anchor="ctr" anchorCtr="0"/>
-          <a:lstStyle>
-            <a:lvl1pPr lvl="0" algn="ctr">
-              <a:spcBef>
-                <a:spcPts val="0"/>
-              </a:spcBef>
-              <a:spcAft>
-                <a:spcPts val="0"/>
-              </a:spcAft>
-              <a:buSzPts val="3600"/>
-              <a:buNone/>
-              <a:defRPr sz="3600"/>
-            </a:lvl1pPr>
-            <a:lvl2pPr lvl="1" algn="ctr">
-              <a:spcBef>
-                <a:spcPts val="0"/>
-              </a:spcBef>
-              <a:spcAft>
-                <a:spcPts val="0"/>
-              </a:spcAft>
-              <a:buSzPts val="3600"/>
-              <a:buNone/>
-              <a:defRPr sz="3600"/>
-            </a:lvl2pPr>
-            <a:lvl3pPr lvl="2" algn="ctr">
-              <a:spcBef>
-                <a:spcPts val="0"/>
-              </a:spcBef>
-              <a:spcAft>
-                <a:spcPts val="0"/>
-              </a:spcAft>
-              <a:buSzPts val="3600"/>
-              <a:buNone/>
-              <a:defRPr sz="3600"/>
-            </a:lvl3pPr>
-            <a:lvl4pPr lvl="3" algn="ctr">
-              <a:spcBef>
-                <a:spcPts val="0"/>
-              </a:spcBef>
-              <a:spcAft>
-                <a:spcPts val="0"/>
-              </a:spcAft>
-              <a:buSzPts val="3600"/>
-              <a:buNone/>
-              <a:defRPr sz="3600"/>
-            </a:lvl4pPr>
-            <a:lvl5pPr lvl="4" algn="ctr">
-              <a:spcBef>
-                <a:spcPts val="0"/>
-              </a:spcBef>
-              <a:spcAft>
-                <a:spcPts val="0"/>
-              </a:spcAft>
-              <a:buSzPts val="3600"/>
-              <a:buNone/>
-              <a:defRPr sz="3600"/>
-            </a:lvl5pPr>
-            <a:lvl6pPr lvl="5" algn="ctr">
-              <a:spcBef>
-                <a:spcPts val="0"/>
-              </a:spcBef>
-              <a:spcAft>
-                <a:spcPts val="0"/>
-              </a:spcAft>
-              <a:buSzPts val="3600"/>
-              <a:buNone/>
-              <a:defRPr sz="3600"/>
-            </a:lvl6pPr>
-            <a:lvl7pPr lvl="6" algn="ctr">
-              <a:spcBef>
-                <a:spcPts val="0"/>
-              </a:spcBef>
-              <a:spcAft>
-                <a:spcPts val="0"/>
-              </a:spcAft>
-              <a:buSzPts val="3600"/>
-              <a:buNone/>
-              <a:defRPr sz="3600"/>
-            </a:lvl7pPr>
-            <a:lvl8pPr lvl="7" algn="ctr">
-              <a:spcBef>
-                <a:spcPts val="0"/>
-              </a:spcBef>
-              <a:spcAft>
-                <a:spcPts val="0"/>
-              </a:spcAft>
-              <a:buSzPts val="3600"/>
-              <a:buNone/>
-              <a:defRPr sz="3600"/>
-            </a:lvl8pPr>
-            <a:lvl9pPr lvl="8" algn="ctr">
-              <a:spcBef>
-                <a:spcPts val="0"/>
-              </a:spcBef>
-              <a:spcAft>
-                <a:spcPts val="0"/>
-              </a:spcAft>
-              <a:buSzPts val="3600"/>
-              <a:buNone/>
-              <a:defRPr sz="3600"/>
-            </a:lvl9pPr>
-          </a:lstStyle>
-          <a:p>
-            <a:endParaRPr/>
-          </a:p>
-        </p:txBody>
-      </p:sp>
-      <p:sp>
-        <p:nvSpPr>
-          <p:cNvPr id="15" name="Shape 15"/>
-          <p:cNvSpPr txBox="1">
-            <a:spLocks noGrp="1"/>
-          </p:cNvSpPr>
-          <p:nvPr>
-            <p:ph type="sldNum" idx="12"/>
-          </p:nvPr>
-        </p:nvSpPr>
-        <p:spPr>
-          <a:xfrm>
-            <a:off x="8472458" y="4663217"/>
-            <a:ext cx="548700" cy="393600"/>
-          </a:xfrm>
-          <a:prstGeom prst="rect">
-            <a:avLst/>
-          </a:prstGeom>
-        </p:spPr>
-        <p:txBody>
-          <a:bodyPr spcFirstLastPara="1" wrap="square" lIns="91425" tIns="91425" rIns="91425" bIns="91425" anchor="ctr" anchorCtr="0">
-            <a:noAutofit/>
-          </a:bodyPr>
-          <a:lstStyle>
-            <a:lvl1pPr lvl="0">
-              <a:buNone/>
-              <a:defRPr/>
-            </a:lvl1pPr>
-            <a:lvl2pPr lvl="1">
-              <a:buNone/>
-              <a:defRPr/>
-            </a:lvl2pPr>
-            <a:lvl3pPr lvl="2">
-              <a:buNone/>
-              <a:defRPr/>
-            </a:lvl3pPr>
-            <a:lvl4pPr lvl="3">
-              <a:buNone/>
-              <a:defRPr/>
-            </a:lvl4pPr>
-            <a:lvl5pPr lvl="4">
-              <a:buNone/>
-              <a:defRPr/>
-            </a:lvl5pPr>
-            <a:lvl6pPr lvl="5">
-              <a:buNone/>
-              <a:defRPr/>
-            </a:lvl6pPr>
-            <a:lvl7pPr lvl="6">
-              <a:buNone/>
-              <a:defRPr/>
-            </a:lvl7pPr>
-            <a:lvl8pPr lvl="7">
-              <a:buNone/>
-              <a:defRPr/>
-            </a:lvl8pPr>
-            <a:lvl9pPr lvl="8">
-              <a:buNone/>
-              <a:defRPr/>
-            </a:lvl9pPr>
-          </a:lstStyle>
-          <a:p>
-            <a:pPr marL="0" lvl="0" indent="0">
-              <a:spcBef>
-                <a:spcPts val="0"/>
-              </a:spcBef>
-              <a:spcAft>
-                <a:spcPts val="0"/>
-              </a:spcAft>
-              <a:buNone/>
-            </a:pPr>
-            <a:fld id="{00000000-1234-1234-1234-123412341234}" type="slidenum">
-              <a:rPr lang="en"/>
-              <a:t>‹#›</a:t>
-            </a:fld>
-            <a:endParaRPr/>
-          </a:p>
-        </p:txBody>
-      </p:sp>
-    </p:spTree>
-  </p:cSld>
-  <p:clrMapOvr>
-    <a:masterClrMapping/>
-  </p:clrMapOvr>
-</p:sldLayout>
-</file>
-
-<file path=ppt/slideLayouts/slideLayout3.xml><?xml version="1.0" encoding="utf-8"?>
 <p:sldLayout xmlns:a="http://schemas.openxmlformats.org/drawingml/2006/main" xmlns:r="http://schemas.openxmlformats.org/officeDocument/2006/relationships" xmlns:p="http://schemas.openxmlformats.org/presentationml/2006/main" matchingName="Title and body" type="tx">
   <p:cSld name="TITLE_AND_BODY">
     <p:spTree>
@@ -7141,7 +6550,7 @@
 </p:sldLayout>
 </file>
 
-<file path=ppt/slideLayouts/slideLayout4.xml><?xml version="1.0" encoding="utf-8"?>
+<file path=ppt/slideLayouts/slideLayout3.xml><?xml version="1.0" encoding="utf-8"?>
 <p:sldLayout xmlns:a="http://schemas.openxmlformats.org/drawingml/2006/main" xmlns:r="http://schemas.openxmlformats.org/officeDocument/2006/relationships" xmlns:p="http://schemas.openxmlformats.org/presentationml/2006/main" matchingName="Title and two columns" type="twoColTx">
   <p:cSld name="TITLE_AND_TWO_COLUMNS">
     <p:spTree>
@@ -7752,7 +7161,7 @@
 </p:sldLayout>
 </file>
 
-<file path=ppt/slideLayouts/slideLayout5.xml><?xml version="1.0" encoding="utf-8"?>
+<file path=ppt/slideLayouts/slideLayout4.xml><?xml version="1.0" encoding="utf-8"?>
 <p:sldLayout xmlns:a="http://schemas.openxmlformats.org/drawingml/2006/main" xmlns:r="http://schemas.openxmlformats.org/officeDocument/2006/relationships" xmlns:p="http://schemas.openxmlformats.org/presentationml/2006/main" matchingName="Title only" type="titleOnly">
   <p:cSld name="TITLE_ONLY">
     <p:spTree>
@@ -7983,7 +7392,7 @@
 </p:sldLayout>
 </file>
 
-<file path=ppt/slideLayouts/slideLayout6.xml><?xml version="1.0" encoding="utf-8"?>
+<file path=ppt/slideLayouts/slideLayout5.xml><?xml version="1.0" encoding="utf-8"?>
 <p:sldLayout xmlns:a="http://schemas.openxmlformats.org/drawingml/2006/main" xmlns:r="http://schemas.openxmlformats.org/officeDocument/2006/relationships" xmlns:p="http://schemas.openxmlformats.org/presentationml/2006/main" matchingName="One column text">
   <p:cSld name="ONE_COLUMN_TEXT">
     <p:spTree>
@@ -8404,7 +7813,7 @@
 </p:sldLayout>
 </file>
 
-<file path=ppt/slideLayouts/slideLayout7.xml><?xml version="1.0" encoding="utf-8"?>
+<file path=ppt/slideLayouts/slideLayout6.xml><?xml version="1.0" encoding="utf-8"?>
 <p:sldLayout xmlns:a="http://schemas.openxmlformats.org/drawingml/2006/main" xmlns:r="http://schemas.openxmlformats.org/officeDocument/2006/relationships" xmlns:p="http://schemas.openxmlformats.org/presentationml/2006/main" matchingName="Main point">
   <p:cSld name="MAIN_POINT">
     <p:spTree>
@@ -8635,7 +8044,7 @@
 </p:sldLayout>
 </file>
 
-<file path=ppt/slideLayouts/slideLayout8.xml><?xml version="1.0" encoding="utf-8"?>
+<file path=ppt/slideLayouts/slideLayout7.xml><?xml version="1.0" encoding="utf-8"?>
 <p:sldLayout xmlns:a="http://schemas.openxmlformats.org/drawingml/2006/main" xmlns:r="http://schemas.openxmlformats.org/officeDocument/2006/relationships" xmlns:p="http://schemas.openxmlformats.org/presentationml/2006/main" matchingName="Section title and description">
   <p:cSld name="SECTION_TITLE_AND_DESCRIPTION">
     <p:spTree>
@@ -9187,7 +8596,7 @@
 </p:sldLayout>
 </file>
 
-<file path=ppt/slideLayouts/slideLayout9.xml><?xml version="1.0" encoding="utf-8"?>
+<file path=ppt/slideLayouts/slideLayout8.xml><?xml version="1.0" encoding="utf-8"?>
 <p:sldLayout xmlns:a="http://schemas.openxmlformats.org/drawingml/2006/main" xmlns:r="http://schemas.openxmlformats.org/officeDocument/2006/relationships" xmlns:p="http://schemas.openxmlformats.org/presentationml/2006/main" matchingName="Caption">
   <p:cSld name="CAPTION_ONLY">
     <p:spTree>
@@ -9249,6 +8658,366 @@
       <p:sp>
         <p:nvSpPr>
           <p:cNvPr id="43" name="Shape 43"/>
+          <p:cNvSpPr txBox="1">
+            <a:spLocks noGrp="1"/>
+          </p:cNvSpPr>
+          <p:nvPr>
+            <p:ph type="sldNum" idx="12"/>
+          </p:nvPr>
+        </p:nvSpPr>
+        <p:spPr>
+          <a:xfrm>
+            <a:off x="8472458" y="4663217"/>
+            <a:ext cx="548700" cy="393600"/>
+          </a:xfrm>
+          <a:prstGeom prst="rect">
+            <a:avLst/>
+          </a:prstGeom>
+        </p:spPr>
+        <p:txBody>
+          <a:bodyPr spcFirstLastPara="1" wrap="square" lIns="91425" tIns="91425" rIns="91425" bIns="91425" anchor="ctr" anchorCtr="0">
+            <a:noAutofit/>
+          </a:bodyPr>
+          <a:lstStyle>
+            <a:lvl1pPr lvl="0">
+              <a:buNone/>
+              <a:defRPr/>
+            </a:lvl1pPr>
+            <a:lvl2pPr lvl="1">
+              <a:buNone/>
+              <a:defRPr/>
+            </a:lvl2pPr>
+            <a:lvl3pPr lvl="2">
+              <a:buNone/>
+              <a:defRPr/>
+            </a:lvl3pPr>
+            <a:lvl4pPr lvl="3">
+              <a:buNone/>
+              <a:defRPr/>
+            </a:lvl4pPr>
+            <a:lvl5pPr lvl="4">
+              <a:buNone/>
+              <a:defRPr/>
+            </a:lvl5pPr>
+            <a:lvl6pPr lvl="5">
+              <a:buNone/>
+              <a:defRPr/>
+            </a:lvl6pPr>
+            <a:lvl7pPr lvl="6">
+              <a:buNone/>
+              <a:defRPr/>
+            </a:lvl7pPr>
+            <a:lvl8pPr lvl="7">
+              <a:buNone/>
+              <a:defRPr/>
+            </a:lvl8pPr>
+            <a:lvl9pPr lvl="8">
+              <a:buNone/>
+              <a:defRPr/>
+            </a:lvl9pPr>
+          </a:lstStyle>
+          <a:p>
+            <a:pPr marL="0" lvl="0" indent="0">
+              <a:spcBef>
+                <a:spcPts val="0"/>
+              </a:spcBef>
+              <a:spcAft>
+                <a:spcPts val="0"/>
+              </a:spcAft>
+              <a:buNone/>
+            </a:pPr>
+            <a:fld id="{00000000-1234-1234-1234-123412341234}" type="slidenum">
+              <a:rPr lang="en"/>
+              <a:t>‹#›</a:t>
+            </a:fld>
+            <a:endParaRPr/>
+          </a:p>
+        </p:txBody>
+      </p:sp>
+    </p:spTree>
+  </p:cSld>
+  <p:clrMapOvr>
+    <a:masterClrMapping/>
+  </p:clrMapOvr>
+</p:sldLayout>
+</file>
+
+<file path=ppt/slideLayouts/slideLayout9.xml><?xml version="1.0" encoding="utf-8"?>
+<p:sldLayout xmlns:a="http://schemas.openxmlformats.org/drawingml/2006/main" xmlns:r="http://schemas.openxmlformats.org/officeDocument/2006/relationships" xmlns:p="http://schemas.openxmlformats.org/presentationml/2006/main" matchingName="Big number">
+  <p:cSld name="BIG_NUMBER">
+    <p:spTree>
+      <p:nvGrpSpPr>
+        <p:cNvPr id="1" name="Shape 44"/>
+        <p:cNvGrpSpPr/>
+        <p:nvPr/>
+      </p:nvGrpSpPr>
+      <p:grpSpPr>
+        <a:xfrm>
+          <a:off x="0" y="0"/>
+          <a:ext cx="0" cy="0"/>
+          <a:chOff x="0" y="0"/>
+          <a:chExt cx="0" cy="0"/>
+        </a:xfrm>
+      </p:grpSpPr>
+      <p:sp>
+        <p:nvSpPr>
+          <p:cNvPr id="45" name="Shape 45"/>
+          <p:cNvSpPr txBox="1">
+            <a:spLocks noGrp="1"/>
+          </p:cNvSpPr>
+          <p:nvPr>
+            <p:ph type="title" hasCustomPrompt="1"/>
+          </p:nvPr>
+        </p:nvSpPr>
+        <p:spPr>
+          <a:xfrm>
+            <a:off x="311700" y="1106125"/>
+            <a:ext cx="8520600" cy="1963500"/>
+          </a:xfrm>
+          <a:prstGeom prst="rect">
+            <a:avLst/>
+          </a:prstGeom>
+        </p:spPr>
+        <p:txBody>
+          <a:bodyPr spcFirstLastPara="1" wrap="square" lIns="91425" tIns="91425" rIns="91425" bIns="91425" anchor="b" anchorCtr="0"/>
+          <a:lstStyle>
+            <a:lvl1pPr lvl="0" algn="ctr">
+              <a:spcBef>
+                <a:spcPts val="0"/>
+              </a:spcBef>
+              <a:spcAft>
+                <a:spcPts val="0"/>
+              </a:spcAft>
+              <a:buSzPts val="12000"/>
+              <a:buNone/>
+              <a:defRPr sz="12000"/>
+            </a:lvl1pPr>
+            <a:lvl2pPr lvl="1" algn="ctr">
+              <a:spcBef>
+                <a:spcPts val="0"/>
+              </a:spcBef>
+              <a:spcAft>
+                <a:spcPts val="0"/>
+              </a:spcAft>
+              <a:buSzPts val="12000"/>
+              <a:buNone/>
+              <a:defRPr sz="12000"/>
+            </a:lvl2pPr>
+            <a:lvl3pPr lvl="2" algn="ctr">
+              <a:spcBef>
+                <a:spcPts val="0"/>
+              </a:spcBef>
+              <a:spcAft>
+                <a:spcPts val="0"/>
+              </a:spcAft>
+              <a:buSzPts val="12000"/>
+              <a:buNone/>
+              <a:defRPr sz="12000"/>
+            </a:lvl3pPr>
+            <a:lvl4pPr lvl="3" algn="ctr">
+              <a:spcBef>
+                <a:spcPts val="0"/>
+              </a:spcBef>
+              <a:spcAft>
+                <a:spcPts val="0"/>
+              </a:spcAft>
+              <a:buSzPts val="12000"/>
+              <a:buNone/>
+              <a:defRPr sz="12000"/>
+            </a:lvl4pPr>
+            <a:lvl5pPr lvl="4" algn="ctr">
+              <a:spcBef>
+                <a:spcPts val="0"/>
+              </a:spcBef>
+              <a:spcAft>
+                <a:spcPts val="0"/>
+              </a:spcAft>
+              <a:buSzPts val="12000"/>
+              <a:buNone/>
+              <a:defRPr sz="12000"/>
+            </a:lvl5pPr>
+            <a:lvl6pPr lvl="5" algn="ctr">
+              <a:spcBef>
+                <a:spcPts val="0"/>
+              </a:spcBef>
+              <a:spcAft>
+                <a:spcPts val="0"/>
+              </a:spcAft>
+              <a:buSzPts val="12000"/>
+              <a:buNone/>
+              <a:defRPr sz="12000"/>
+            </a:lvl6pPr>
+            <a:lvl7pPr lvl="6" algn="ctr">
+              <a:spcBef>
+                <a:spcPts val="0"/>
+              </a:spcBef>
+              <a:spcAft>
+                <a:spcPts val="0"/>
+              </a:spcAft>
+              <a:buSzPts val="12000"/>
+              <a:buNone/>
+              <a:defRPr sz="12000"/>
+            </a:lvl7pPr>
+            <a:lvl8pPr lvl="7" algn="ctr">
+              <a:spcBef>
+                <a:spcPts val="0"/>
+              </a:spcBef>
+              <a:spcAft>
+                <a:spcPts val="0"/>
+              </a:spcAft>
+              <a:buSzPts val="12000"/>
+              <a:buNone/>
+              <a:defRPr sz="12000"/>
+            </a:lvl8pPr>
+            <a:lvl9pPr lvl="8" algn="ctr">
+              <a:spcBef>
+                <a:spcPts val="0"/>
+              </a:spcBef>
+              <a:spcAft>
+                <a:spcPts val="0"/>
+              </a:spcAft>
+              <a:buSzPts val="12000"/>
+              <a:buNone/>
+              <a:defRPr sz="12000"/>
+            </a:lvl9pPr>
+          </a:lstStyle>
+          <a:p>
+            <a:r>
+              <a:t>xx%</a:t>
+            </a:r>
+          </a:p>
+        </p:txBody>
+      </p:sp>
+      <p:sp>
+        <p:nvSpPr>
+          <p:cNvPr id="46" name="Shape 46"/>
+          <p:cNvSpPr txBox="1">
+            <a:spLocks noGrp="1"/>
+          </p:cNvSpPr>
+          <p:nvPr>
+            <p:ph type="body" idx="1"/>
+          </p:nvPr>
+        </p:nvSpPr>
+        <p:spPr>
+          <a:xfrm>
+            <a:off x="311700" y="3152225"/>
+            <a:ext cx="8520600" cy="1300800"/>
+          </a:xfrm>
+          <a:prstGeom prst="rect">
+            <a:avLst/>
+          </a:prstGeom>
+        </p:spPr>
+        <p:txBody>
+          <a:bodyPr spcFirstLastPara="1" wrap="square" lIns="91425" tIns="91425" rIns="91425" bIns="91425" anchor="t" anchorCtr="0"/>
+          <a:lstStyle>
+            <a:lvl1pPr marL="457200" lvl="0" indent="-342900" algn="ctr">
+              <a:spcBef>
+                <a:spcPts val="0"/>
+              </a:spcBef>
+              <a:spcAft>
+                <a:spcPts val="0"/>
+              </a:spcAft>
+              <a:buSzPts val="1800"/>
+              <a:buChar char="●"/>
+              <a:defRPr/>
+            </a:lvl1pPr>
+            <a:lvl2pPr marL="914400" lvl="1" indent="-317500" algn="ctr">
+              <a:spcBef>
+                <a:spcPts val="1600"/>
+              </a:spcBef>
+              <a:spcAft>
+                <a:spcPts val="0"/>
+              </a:spcAft>
+              <a:buSzPts val="1400"/>
+              <a:buChar char="○"/>
+              <a:defRPr/>
+            </a:lvl2pPr>
+            <a:lvl3pPr marL="1371600" lvl="2" indent="-317500" algn="ctr">
+              <a:spcBef>
+                <a:spcPts val="1600"/>
+              </a:spcBef>
+              <a:spcAft>
+                <a:spcPts val="0"/>
+              </a:spcAft>
+              <a:buSzPts val="1400"/>
+              <a:buChar char="■"/>
+              <a:defRPr/>
+            </a:lvl3pPr>
+            <a:lvl4pPr marL="1828800" lvl="3" indent="-317500" algn="ctr">
+              <a:spcBef>
+                <a:spcPts val="1600"/>
+              </a:spcBef>
+              <a:spcAft>
+                <a:spcPts val="0"/>
+              </a:spcAft>
+              <a:buSzPts val="1400"/>
+              <a:buChar char="●"/>
+              <a:defRPr/>
+            </a:lvl4pPr>
+            <a:lvl5pPr marL="2286000" lvl="4" indent="-317500" algn="ctr">
+              <a:spcBef>
+                <a:spcPts val="1600"/>
+              </a:spcBef>
+              <a:spcAft>
+                <a:spcPts val="0"/>
+              </a:spcAft>
+              <a:buSzPts val="1400"/>
+              <a:buChar char="○"/>
+              <a:defRPr/>
+            </a:lvl5pPr>
+            <a:lvl6pPr marL="2743200" lvl="5" indent="-317500" algn="ctr">
+              <a:spcBef>
+                <a:spcPts val="1600"/>
+              </a:spcBef>
+              <a:spcAft>
+                <a:spcPts val="0"/>
+              </a:spcAft>
+              <a:buSzPts val="1400"/>
+              <a:buChar char="■"/>
+              <a:defRPr/>
+            </a:lvl6pPr>
+            <a:lvl7pPr marL="3200400" lvl="6" indent="-317500" algn="ctr">
+              <a:spcBef>
+                <a:spcPts val="1600"/>
+              </a:spcBef>
+              <a:spcAft>
+                <a:spcPts val="0"/>
+              </a:spcAft>
+              <a:buSzPts val="1400"/>
+              <a:buChar char="●"/>
+              <a:defRPr/>
+            </a:lvl7pPr>
+            <a:lvl8pPr marL="3657600" lvl="7" indent="-317500" algn="ctr">
+              <a:spcBef>
+                <a:spcPts val="1600"/>
+              </a:spcBef>
+              <a:spcAft>
+                <a:spcPts val="0"/>
+              </a:spcAft>
+              <a:buSzPts val="1400"/>
+              <a:buChar char="○"/>
+              <a:defRPr/>
+            </a:lvl8pPr>
+            <a:lvl9pPr marL="4114800" lvl="8" indent="-317500" algn="ctr">
+              <a:spcBef>
+                <a:spcPts val="1600"/>
+              </a:spcBef>
+              <a:spcAft>
+                <a:spcPts val="1600"/>
+              </a:spcAft>
+              <a:buSzPts val="1400"/>
+              <a:buChar char="■"/>
+              <a:defRPr/>
+            </a:lvl9pPr>
+          </a:lstStyle>
+          <a:p>
+            <a:endParaRPr/>
+          </a:p>
+        </p:txBody>
+      </p:sp>
+      <p:sp>
+        <p:nvSpPr>
+          <p:cNvPr id="47" name="Shape 47"/>
           <p:cNvSpPr txBox="1">
             <a:spLocks noGrp="1"/>
           </p:cNvSpPr>
@@ -9897,16 +9666,15 @@
   <p:clrMap bg1="lt1" tx1="dk1" bg2="dk2" tx2="lt2" accent1="accent1" accent2="accent2" accent3="accent3" accent4="accent4" accent5="accent5" accent6="accent6" hlink="hlink" folHlink="folHlink"/>
   <p:sldLayoutIdLst>
     <p:sldLayoutId id="2147483648" r:id="rId1"/>
-    <p:sldLayoutId id="2147483649" r:id="rId2"/>
-    <p:sldLayoutId id="2147483650" r:id="rId3"/>
-    <p:sldLayoutId id="2147483651" r:id="rId4"/>
-    <p:sldLayoutId id="2147483652" r:id="rId5"/>
-    <p:sldLayoutId id="2147483653" r:id="rId6"/>
-    <p:sldLayoutId id="2147483654" r:id="rId7"/>
-    <p:sldLayoutId id="2147483655" r:id="rId8"/>
-    <p:sldLayoutId id="2147483656" r:id="rId9"/>
-    <p:sldLayoutId id="2147483657" r:id="rId10"/>
-    <p:sldLayoutId id="2147483658" r:id="rId11"/>
+    <p:sldLayoutId id="2147483650" r:id="rId2"/>
+    <p:sldLayoutId id="2147483651" r:id="rId3"/>
+    <p:sldLayoutId id="2147483652" r:id="rId4"/>
+    <p:sldLayoutId id="2147483653" r:id="rId5"/>
+    <p:sldLayoutId id="2147483654" r:id="rId6"/>
+    <p:sldLayoutId id="2147483655" r:id="rId7"/>
+    <p:sldLayoutId id="2147483656" r:id="rId8"/>
+    <p:sldLayoutId id="2147483657" r:id="rId9"/>
+    <p:sldLayoutId id="2147483658" r:id="rId10"/>
   </p:sldLayoutIdLst>
   <p:hf sldNum="0" hdr="0" ftr="0" dt="0"/>
   <p:txStyles>
@@ -12082,7 +11850,21 @@
                 <a:latin typeface="Andale Mono"/>
                 <a:cs typeface="Andale Mono"/>
               </a:rPr>
-              <a:t>) THEN 1 ELSE 0 END as label</a:t>
+              <a:t>) THEN 1 ELSE 0 END </a:t>
+            </a:r>
+            <a:r>
+              <a:rPr lang="en-US" dirty="0" smtClean="0">
+                <a:latin typeface="Andale Mono"/>
+                <a:cs typeface="Andale Mono"/>
+              </a:rPr>
+              <a:t>AS </a:t>
+            </a:r>
+            <a:r>
+              <a:rPr lang="en-US" dirty="0" smtClean="0">
+                <a:latin typeface="Andale Mono"/>
+                <a:cs typeface="Andale Mono"/>
+              </a:rPr>
+              <a:t>label</a:t>
             </a:r>
           </a:p>
           <a:p>
@@ -34189,10 +33971,14 @@
               <a:buNone/>
             </a:pPr>
             <a:r>
-              <a:rPr lang="en"/>
-              <a:t>Configuring Temporal Parameters (Timechop)</a:t>
+              <a:rPr lang="en" dirty="0"/>
+              <a:t>Configuring Temporal </a:t>
             </a:r>
-            <a:endParaRPr/>
+            <a:r>
+              <a:rPr lang="en" dirty="0" smtClean="0"/>
+              <a:t>Parameters</a:t>
+            </a:r>
+            <a:endParaRPr dirty="0"/>
           </a:p>
         </p:txBody>
       </p:sp>
@@ -42516,11 +42302,7 @@
             </a:pPr>
             <a:r>
               <a:rPr lang="en-US" dirty="0" smtClean="0"/>
-              <a:t>Train and test labels aggregate data from </a:t>
-            </a:r>
-            <a:r>
-              <a:rPr lang="en-US" dirty="0" smtClean="0"/>
-              <a:t>overlapping times</a:t>
+              <a:t>Train and test labels aggregate data from overlapping times</a:t>
             </a:r>
           </a:p>
           <a:p>
@@ -42538,7 +42320,6 @@
               <a:rPr lang="en-US" dirty="0" smtClean="0"/>
               <a:t>Labels and features aggregate data from overlapping times</a:t>
             </a:r>
-            <a:endParaRPr lang="en-US" dirty="0" smtClean="0"/>
           </a:p>
           <a:p>
             <a:pPr marL="457200" lvl="0" indent="-342900" rtl="0">

</xml_diff>

<commit_message>
minor edits to temporal CV slides
</commit_message>
<xml_diff>
--- a/curriculum/3_modeling_and_machine_learning/temporal-cross-validation/temporal_cross_validation_slides.pptx
+++ b/curriculum/3_modeling_and_machine_learning/temporal-cross-validation/temporal_cross_validation_slides.pptx
@@ -291,7 +291,7 @@
   </p:defaultTextStyle>
   <p:extLst>
     <p:ext uri="{EFAFB233-063F-42B5-8137-9DF3F51BA10A}">
-      <p15:sldGuideLst xmlns="" xmlns:mc="http://schemas.openxmlformats.org/markup-compatibility/2006" xmlns:mv="urn:schemas-microsoft-com:mac:vml" xmlns:c="http://schemas.openxmlformats.org/drawingml/2006/chart" xmlns:dgm="http://schemas.openxmlformats.org/drawingml/2006/diagram" xmlns:o="urn:schemas-microsoft-com:office:office" xmlns:v="urn:schemas-microsoft-com:vml" xmlns:pvml="urn:schemas-microsoft-com:office:powerpoint" xmlns:com="http://schemas.openxmlformats.org/drawingml/2006/compatibility" xmlns:p14="http://schemas.microsoft.com/office/powerpoint/2010/main" xmlns:p15="http://schemas.microsoft.com/office/powerpoint/2012/main">
+      <p15:sldGuideLst xmlns:p15="http://schemas.microsoft.com/office/powerpoint/2012/main">
         <p15:guide id="1" orient="horz" pos="1620">
           <p15:clr>
             <a:srgbClr val="A4A3A4"/>
@@ -10471,10 +10471,34 @@
                 <a:tableStyleId>{C1756A4E-26BD-43A2-A02B-71C951CC2857}</a:tableStyleId>
               </a:tblPr>
               <a:tblGrid>
-                <a:gridCol w="1590925"/>
-                <a:gridCol w="1650750"/>
-                <a:gridCol w="2918650"/>
-                <a:gridCol w="1830175"/>
+                <a:gridCol w="1590925">
+                  <a:extLst>
+                    <a:ext uri="{9D8B030D-6E8A-4147-A177-3AD203B41FA5}">
+                      <a16:colId xmlns:a16="http://schemas.microsoft.com/office/drawing/2014/main" val="20000"/>
+                    </a:ext>
+                  </a:extLst>
+                </a:gridCol>
+                <a:gridCol w="1650750">
+                  <a:extLst>
+                    <a:ext uri="{9D8B030D-6E8A-4147-A177-3AD203B41FA5}">
+                      <a16:colId xmlns:a16="http://schemas.microsoft.com/office/drawing/2014/main" val="20001"/>
+                    </a:ext>
+                  </a:extLst>
+                </a:gridCol>
+                <a:gridCol w="2918650">
+                  <a:extLst>
+                    <a:ext uri="{9D8B030D-6E8A-4147-A177-3AD203B41FA5}">
+                      <a16:colId xmlns:a16="http://schemas.microsoft.com/office/drawing/2014/main" val="20002"/>
+                    </a:ext>
+                  </a:extLst>
+                </a:gridCol>
+                <a:gridCol w="1830175">
+                  <a:extLst>
+                    <a:ext uri="{9D8B030D-6E8A-4147-A177-3AD203B41FA5}">
+                      <a16:colId xmlns:a16="http://schemas.microsoft.com/office/drawing/2014/main" val="20003"/>
+                    </a:ext>
+                  </a:extLst>
+                </a:gridCol>
               </a:tblGrid>
               <a:tr h="377450">
                 <a:tc>
@@ -10733,6 +10757,11 @@
                     </a:lnB>
                   </a:tcPr>
                 </a:tc>
+                <a:extLst>
+                  <a:ext uri="{0D108BD9-81ED-4DB2-BD59-A6C34878D82A}">
+                    <a16:rowId xmlns:a16="http://schemas.microsoft.com/office/drawing/2014/main" val="10000"/>
+                  </a:ext>
+                </a:extLst>
               </a:tr>
               <a:tr h="377450">
                 <a:tc>
@@ -10991,6 +11020,11 @@
                     </a:lnB>
                   </a:tcPr>
                 </a:tc>
+                <a:extLst>
+                  <a:ext uri="{0D108BD9-81ED-4DB2-BD59-A6C34878D82A}">
+                    <a16:rowId xmlns:a16="http://schemas.microsoft.com/office/drawing/2014/main" val="10001"/>
+                  </a:ext>
+                </a:extLst>
               </a:tr>
               <a:tr h="377450">
                 <a:tc>
@@ -11258,6 +11292,11 @@
                     </a:lnB>
                   </a:tcPr>
                 </a:tc>
+                <a:extLst>
+                  <a:ext uri="{0D108BD9-81ED-4DB2-BD59-A6C34878D82A}">
+                    <a16:rowId xmlns:a16="http://schemas.microsoft.com/office/drawing/2014/main" val="10002"/>
+                  </a:ext>
+                </a:extLst>
               </a:tr>
               <a:tr h="377450">
                 <a:tc>
@@ -11525,6 +11564,11 @@
                     </a:lnB>
                   </a:tcPr>
                 </a:tc>
+                <a:extLst>
+                  <a:ext uri="{0D108BD9-81ED-4DB2-BD59-A6C34878D82A}">
+                    <a16:rowId xmlns:a16="http://schemas.microsoft.com/office/drawing/2014/main" val="10003"/>
+                  </a:ext>
+                </a:extLst>
               </a:tr>
             </a:tbl>
           </a:graphicData>
@@ -11553,7 +11597,7 @@
           <a:lstStyle/>
           <a:p>
             <a:r>
-              <a:rPr lang="en-US" dirty="0" smtClean="0">
+              <a:rPr lang="en-US" dirty="0">
                 <a:solidFill>
                   <a:srgbClr val="FF0000"/>
                 </a:solidFill>
@@ -11563,7 +11607,7 @@
               <a:t>WITH </a:t>
             </a:r>
             <a:r>
-              <a:rPr lang="en-US" dirty="0" err="1" smtClean="0">
+              <a:rPr lang="en-US" dirty="0" err="1">
                 <a:solidFill>
                   <a:schemeClr val="tx1"/>
                 </a:solidFill>
@@ -11573,7 +11617,7 @@
               <a:t>positive_labels</a:t>
             </a:r>
             <a:r>
-              <a:rPr lang="en-US" dirty="0" smtClean="0">
+              <a:rPr lang="en-US" dirty="0">
                 <a:solidFill>
                   <a:schemeClr val="tx1"/>
                 </a:solidFill>
@@ -11585,7 +11629,7 @@
           </a:p>
           <a:p>
             <a:r>
-              <a:rPr lang="en-US" dirty="0" smtClean="0">
+              <a:rPr lang="en-US" dirty="0">
                 <a:solidFill>
                   <a:srgbClr val="FF0000"/>
                 </a:solidFill>
@@ -11595,27 +11639,27 @@
               <a:t>    SELECT</a:t>
             </a:r>
             <a:r>
-              <a:rPr lang="en-US" dirty="0" smtClean="0">
+              <a:rPr lang="en-US" dirty="0">
                 <a:latin typeface="Andale Mono"/>
                 <a:cs typeface="Andale Mono"/>
               </a:rPr>
               <a:t> </a:t>
             </a:r>
             <a:r>
-              <a:rPr lang="en-US" dirty="0" err="1" smtClean="0">
+              <a:rPr lang="en-US" dirty="0" err="1">
                 <a:latin typeface="Andale Mono"/>
                 <a:cs typeface="Andale Mono"/>
               </a:rPr>
               <a:t>entity_id</a:t>
             </a:r>
-            <a:endParaRPr lang="en-US" dirty="0" smtClean="0">
+            <a:endParaRPr lang="en-US" dirty="0">
               <a:latin typeface="Andale Mono"/>
               <a:cs typeface="Andale Mono"/>
             </a:endParaRPr>
           </a:p>
           <a:p>
             <a:r>
-              <a:rPr lang="en-US" dirty="0" smtClean="0">
+              <a:rPr lang="en-US" dirty="0">
                 <a:solidFill>
                   <a:srgbClr val="FF0000"/>
                 </a:solidFill>
@@ -11625,7 +11669,7 @@
               <a:t>      FROM</a:t>
             </a:r>
             <a:r>
-              <a:rPr lang="en-US" dirty="0" smtClean="0">
+              <a:rPr lang="en-US" dirty="0">
                 <a:latin typeface="Andale Mono"/>
                 <a:cs typeface="Andale Mono"/>
               </a:rPr>
@@ -11634,14 +11678,14 @@
           </a:p>
           <a:p>
             <a:r>
-              <a:rPr lang="en-US" dirty="0" smtClean="0">
+              <a:rPr lang="en-US" dirty="0">
                 <a:latin typeface="Andale Mono"/>
                 <a:cs typeface="Andale Mono"/>
               </a:rPr>
               <a:t>     </a:t>
             </a:r>
             <a:r>
-              <a:rPr lang="en-US" dirty="0" smtClean="0">
+              <a:rPr lang="en-US" dirty="0">
                 <a:solidFill>
                   <a:srgbClr val="FF0000"/>
                 </a:solidFill>
@@ -11651,21 +11695,21 @@
               <a:t>WHERE</a:t>
             </a:r>
             <a:r>
-              <a:rPr lang="en-US" dirty="0" smtClean="0">
+              <a:rPr lang="en-US" dirty="0">
                 <a:latin typeface="Andale Mono"/>
                 <a:cs typeface="Andale Mono"/>
               </a:rPr>
               <a:t> </a:t>
             </a:r>
             <a:r>
-              <a:rPr lang="en-US" dirty="0" err="1" smtClean="0">
+              <a:rPr lang="en-US" dirty="0" err="1">
                 <a:latin typeface="Andale Mono"/>
                 <a:cs typeface="Andale Mono"/>
               </a:rPr>
               <a:t>event_type</a:t>
             </a:r>
             <a:r>
-              <a:rPr lang="en-US" dirty="0" smtClean="0">
+              <a:rPr lang="en-US" dirty="0">
                 <a:latin typeface="Andale Mono"/>
                 <a:cs typeface="Andale Mono"/>
               </a:rPr>
@@ -11674,14 +11718,14 @@
           </a:p>
           <a:p>
             <a:r>
-              <a:rPr lang="en-US" dirty="0" smtClean="0">
+              <a:rPr lang="en-US" dirty="0">
                 <a:latin typeface="Andale Mono"/>
                 <a:cs typeface="Andale Mono"/>
               </a:rPr>
               <a:t>       </a:t>
             </a:r>
             <a:r>
-              <a:rPr lang="en-US" dirty="0" smtClean="0">
+              <a:rPr lang="en-US" dirty="0">
                 <a:solidFill>
                   <a:srgbClr val="FF0000"/>
                 </a:solidFill>
@@ -11691,21 +11735,21 @@
               <a:t>AND</a:t>
             </a:r>
             <a:r>
-              <a:rPr lang="en-US" dirty="0" smtClean="0">
+              <a:rPr lang="en-US" dirty="0">
                 <a:latin typeface="Andale Mono"/>
                 <a:cs typeface="Andale Mono"/>
               </a:rPr>
               <a:t> </a:t>
             </a:r>
             <a:r>
-              <a:rPr lang="en-US" dirty="0" err="1" smtClean="0">
+              <a:rPr lang="en-US" dirty="0" err="1">
                 <a:latin typeface="Andale Mono"/>
                 <a:cs typeface="Andale Mono"/>
               </a:rPr>
               <a:t>event_date</a:t>
             </a:r>
             <a:r>
-              <a:rPr lang="en-US" dirty="0" smtClean="0">
+              <a:rPr lang="en-US" dirty="0">
                 <a:latin typeface="Andale Mono"/>
                 <a:cs typeface="Andale Mono"/>
               </a:rPr>
@@ -11718,17 +11762,10 @@
                 <a:latin typeface="Andale Mono"/>
                 <a:cs typeface="Andale Mono"/>
               </a:rPr>
-              <a:t> </a:t>
+              <a:t>       </a:t>
             </a:r>
             <a:r>
-              <a:rPr lang="en-US" dirty="0" smtClean="0">
-                <a:latin typeface="Andale Mono"/>
-                <a:cs typeface="Andale Mono"/>
-              </a:rPr>
-              <a:t>      </a:t>
-            </a:r>
-            <a:r>
-              <a:rPr lang="en-US" dirty="0" smtClean="0">
+              <a:rPr lang="en-US" dirty="0">
                 <a:solidFill>
                   <a:srgbClr val="FF0000"/>
                 </a:solidFill>
@@ -11738,42 +11775,28 @@
               <a:t>AND</a:t>
             </a:r>
             <a:r>
-              <a:rPr lang="en-US" dirty="0" smtClean="0">
+              <a:rPr lang="en-US" dirty="0">
                 <a:latin typeface="Andale Mono"/>
                 <a:cs typeface="Andale Mono"/>
               </a:rPr>
               <a:t> </a:t>
             </a:r>
             <a:r>
-              <a:rPr lang="en-US" dirty="0" err="1" smtClean="0">
+              <a:rPr lang="en-US" dirty="0" err="1">
                 <a:latin typeface="Andale Mono"/>
                 <a:cs typeface="Andale Mono"/>
               </a:rPr>
               <a:t>event_date</a:t>
             </a:r>
             <a:r>
-              <a:rPr lang="en-US" dirty="0" smtClean="0">
-                <a:latin typeface="Andale Mono"/>
-                <a:cs typeface="Andale Mono"/>
-              </a:rPr>
-              <a:t> &lt; (‘2012-01-01 </a:t>
-            </a:r>
-            <a:r>
               <a:rPr lang="en-US" dirty="0">
                 <a:latin typeface="Andale Mono"/>
                 <a:cs typeface="Andale Mono"/>
               </a:rPr>
-              <a:t>+</a:t>
+              <a:t> &lt; (‘2012-01-01 + </a:t>
             </a:r>
             <a:r>
-              <a:rPr lang="en-US" dirty="0" smtClean="0">
-                <a:latin typeface="Andale Mono"/>
-                <a:cs typeface="Andale Mono"/>
-              </a:rPr>
-              <a:t> </a:t>
-            </a:r>
-            <a:r>
-              <a:rPr lang="en-US" dirty="0" smtClean="0">
+              <a:rPr lang="en-US" dirty="0">
                 <a:solidFill>
                   <a:srgbClr val="3366FF"/>
                 </a:solidFill>
@@ -11783,7 +11806,7 @@
               <a:t>INTERVAL</a:t>
             </a:r>
             <a:r>
-              <a:rPr lang="en-US" dirty="0" smtClean="0">
+              <a:rPr lang="en-US" dirty="0">
                 <a:latin typeface="Andale Mono"/>
                 <a:cs typeface="Andale Mono"/>
               </a:rPr>
@@ -11792,7 +11815,7 @@
           </a:p>
           <a:p>
             <a:r>
-              <a:rPr lang="en-US" dirty="0" smtClean="0">
+              <a:rPr lang="en-US" dirty="0">
                 <a:latin typeface="Andale Mono"/>
                 <a:cs typeface="Andale Mono"/>
               </a:rPr>
@@ -11815,61 +11838,40 @@
                 <a:latin typeface="Andale Mono"/>
                 <a:cs typeface="Andale Mono"/>
               </a:rPr>
-              <a:t> </a:t>
+              <a:t> CASE WHEN </a:t>
             </a:r>
             <a:r>
-              <a:rPr lang="en-US" dirty="0" smtClean="0">
-                <a:latin typeface="Andale Mono"/>
-                <a:cs typeface="Andale Mono"/>
-              </a:rPr>
-              <a:t>CASE WHEN </a:t>
-            </a:r>
-            <a:r>
-              <a:rPr lang="en-US" dirty="0" err="1" smtClean="0">
+              <a:rPr lang="en-US" dirty="0" err="1">
                 <a:latin typeface="Andale Mono"/>
                 <a:cs typeface="Andale Mono"/>
               </a:rPr>
               <a:t>entity_id</a:t>
             </a:r>
             <a:r>
-              <a:rPr lang="en-US" dirty="0" smtClean="0">
+              <a:rPr lang="en-US" dirty="0">
                 <a:latin typeface="Andale Mono"/>
                 <a:cs typeface="Andale Mono"/>
               </a:rPr>
               <a:t> IN (</a:t>
             </a:r>
             <a:r>
-              <a:rPr lang="en-US" dirty="0" err="1" smtClean="0">
+              <a:rPr lang="en-US" dirty="0" err="1">
                 <a:latin typeface="Andale Mono"/>
                 <a:cs typeface="Andale Mono"/>
               </a:rPr>
               <a:t>positive_labels</a:t>
             </a:r>
             <a:r>
-              <a:rPr lang="en-US" dirty="0" smtClean="0">
+              <a:rPr lang="en-US" dirty="0">
                 <a:latin typeface="Andale Mono"/>
                 <a:cs typeface="Andale Mono"/>
               </a:rPr>
-              <a:t>) THEN 1 ELSE 0 END </a:t>
-            </a:r>
-            <a:r>
-              <a:rPr lang="en-US" dirty="0" smtClean="0">
-                <a:latin typeface="Andale Mono"/>
-                <a:cs typeface="Andale Mono"/>
-              </a:rPr>
-              <a:t>AS </a:t>
-            </a:r>
-            <a:r>
-              <a:rPr lang="en-US" dirty="0" smtClean="0">
-                <a:latin typeface="Andale Mono"/>
-                <a:cs typeface="Andale Mono"/>
-              </a:rPr>
-              <a:t>label</a:t>
+              <a:t>) THEN 1 ELSE 0 END AS label</a:t>
             </a:r>
           </a:p>
           <a:p>
             <a:r>
-              <a:rPr lang="en-US" dirty="0" smtClean="0">
+              <a:rPr lang="en-US" dirty="0">
                 <a:latin typeface="Andale Mono"/>
                 <a:cs typeface="Andale Mono"/>
               </a:rPr>
@@ -11890,14 +11892,7 @@
                 <a:latin typeface="Andale Mono"/>
                 <a:cs typeface="Andale Mono"/>
               </a:rPr>
-              <a:t> </a:t>
-            </a:r>
-            <a:r>
-              <a:rPr lang="en-US" dirty="0" smtClean="0">
-                <a:latin typeface="Andale Mono"/>
-                <a:cs typeface="Andale Mono"/>
-              </a:rPr>
-              <a:t>entities</a:t>
+              <a:t> entities</a:t>
             </a:r>
           </a:p>
           <a:p>
@@ -12002,11 +11997,7 @@
             </a:pPr>
             <a:r>
               <a:rPr lang="en" dirty="0"/>
-              <a:t>Finding Train-Test </a:t>
-            </a:r>
-            <a:r>
-              <a:rPr lang="en" dirty="0" smtClean="0"/>
-              <a:t>Splits</a:t>
+              <a:t>Finding Train-Test Splits</a:t>
             </a:r>
             <a:endParaRPr dirty="0"/>
           </a:p>
@@ -12305,10 +12296,34 @@
                 <a:tableStyleId>{C1756A4E-26BD-43A2-A02B-71C951CC2857}</a:tableStyleId>
               </a:tblPr>
               <a:tblGrid>
-                <a:gridCol w="1590925"/>
-                <a:gridCol w="1650750"/>
-                <a:gridCol w="2918650"/>
-                <a:gridCol w="1830175"/>
+                <a:gridCol w="1590925">
+                  <a:extLst>
+                    <a:ext uri="{9D8B030D-6E8A-4147-A177-3AD203B41FA5}">
+                      <a16:colId xmlns:a16="http://schemas.microsoft.com/office/drawing/2014/main" val="20000"/>
+                    </a:ext>
+                  </a:extLst>
+                </a:gridCol>
+                <a:gridCol w="1650750">
+                  <a:extLst>
+                    <a:ext uri="{9D8B030D-6E8A-4147-A177-3AD203B41FA5}">
+                      <a16:colId xmlns:a16="http://schemas.microsoft.com/office/drawing/2014/main" val="20001"/>
+                    </a:ext>
+                  </a:extLst>
+                </a:gridCol>
+                <a:gridCol w="2918650">
+                  <a:extLst>
+                    <a:ext uri="{9D8B030D-6E8A-4147-A177-3AD203B41FA5}">
+                      <a16:colId xmlns:a16="http://schemas.microsoft.com/office/drawing/2014/main" val="20002"/>
+                    </a:ext>
+                  </a:extLst>
+                </a:gridCol>
+                <a:gridCol w="1830175">
+                  <a:extLst>
+                    <a:ext uri="{9D8B030D-6E8A-4147-A177-3AD203B41FA5}">
+                      <a16:colId xmlns:a16="http://schemas.microsoft.com/office/drawing/2014/main" val="20003"/>
+                    </a:ext>
+                  </a:extLst>
+                </a:gridCol>
               </a:tblGrid>
               <a:tr h="377450">
                 <a:tc>
@@ -12567,6 +12582,11 @@
                     </a:lnB>
                   </a:tcPr>
                 </a:tc>
+                <a:extLst>
+                  <a:ext uri="{0D108BD9-81ED-4DB2-BD59-A6C34878D82A}">
+                    <a16:rowId xmlns:a16="http://schemas.microsoft.com/office/drawing/2014/main" val="10000"/>
+                  </a:ext>
+                </a:extLst>
               </a:tr>
               <a:tr h="377450">
                 <a:tc>
@@ -12825,6 +12845,11 @@
                     </a:lnB>
                   </a:tcPr>
                 </a:tc>
+                <a:extLst>
+                  <a:ext uri="{0D108BD9-81ED-4DB2-BD59-A6C34878D82A}">
+                    <a16:rowId xmlns:a16="http://schemas.microsoft.com/office/drawing/2014/main" val="10001"/>
+                  </a:ext>
+                </a:extLst>
               </a:tr>
               <a:tr h="377450">
                 <a:tc>
@@ -13087,6 +13112,11 @@
                     </a:lnB>
                   </a:tcPr>
                 </a:tc>
+                <a:extLst>
+                  <a:ext uri="{0D108BD9-81ED-4DB2-BD59-A6C34878D82A}">
+                    <a16:rowId xmlns:a16="http://schemas.microsoft.com/office/drawing/2014/main" val="10002"/>
+                  </a:ext>
+                </a:extLst>
               </a:tr>
               <a:tr h="377450">
                 <a:tc>
@@ -13349,6 +13379,11 @@
                     </a:lnB>
                   </a:tcPr>
                 </a:tc>
+                <a:extLst>
+                  <a:ext uri="{0D108BD9-81ED-4DB2-BD59-A6C34878D82A}">
+                    <a16:rowId xmlns:a16="http://schemas.microsoft.com/office/drawing/2014/main" val="10003"/>
+                  </a:ext>
+                </a:extLst>
               </a:tr>
             </a:tbl>
           </a:graphicData>
@@ -13372,10 +13407,34 @@
                 <a:tableStyleId>{C1756A4E-26BD-43A2-A02B-71C951CC2857}</a:tableStyleId>
               </a:tblPr>
               <a:tblGrid>
-                <a:gridCol w="1590925"/>
-                <a:gridCol w="1650750"/>
-                <a:gridCol w="2918650"/>
-                <a:gridCol w="1830175"/>
+                <a:gridCol w="1590925">
+                  <a:extLst>
+                    <a:ext uri="{9D8B030D-6E8A-4147-A177-3AD203B41FA5}">
+                      <a16:colId xmlns:a16="http://schemas.microsoft.com/office/drawing/2014/main" val="20000"/>
+                    </a:ext>
+                  </a:extLst>
+                </a:gridCol>
+                <a:gridCol w="1650750">
+                  <a:extLst>
+                    <a:ext uri="{9D8B030D-6E8A-4147-A177-3AD203B41FA5}">
+                      <a16:colId xmlns:a16="http://schemas.microsoft.com/office/drawing/2014/main" val="20001"/>
+                    </a:ext>
+                  </a:extLst>
+                </a:gridCol>
+                <a:gridCol w="2918650">
+                  <a:extLst>
+                    <a:ext uri="{9D8B030D-6E8A-4147-A177-3AD203B41FA5}">
+                      <a16:colId xmlns:a16="http://schemas.microsoft.com/office/drawing/2014/main" val="20002"/>
+                    </a:ext>
+                  </a:extLst>
+                </a:gridCol>
+                <a:gridCol w="1830175">
+                  <a:extLst>
+                    <a:ext uri="{9D8B030D-6E8A-4147-A177-3AD203B41FA5}">
+                      <a16:colId xmlns:a16="http://schemas.microsoft.com/office/drawing/2014/main" val="20003"/>
+                    </a:ext>
+                  </a:extLst>
+                </a:gridCol>
               </a:tblGrid>
               <a:tr h="377450">
                 <a:tc>
@@ -13634,6 +13693,11 @@
                     </a:lnB>
                   </a:tcPr>
                 </a:tc>
+                <a:extLst>
+                  <a:ext uri="{0D108BD9-81ED-4DB2-BD59-A6C34878D82A}">
+                    <a16:rowId xmlns:a16="http://schemas.microsoft.com/office/drawing/2014/main" val="10000"/>
+                  </a:ext>
+                </a:extLst>
               </a:tr>
               <a:tr h="377450">
                 <a:tc>
@@ -13892,6 +13956,11 @@
                     </a:lnB>
                   </a:tcPr>
                 </a:tc>
+                <a:extLst>
+                  <a:ext uri="{0D108BD9-81ED-4DB2-BD59-A6C34878D82A}">
+                    <a16:rowId xmlns:a16="http://schemas.microsoft.com/office/drawing/2014/main" val="10001"/>
+                  </a:ext>
+                </a:extLst>
               </a:tr>
               <a:tr h="377450">
                 <a:tc>
@@ -14154,6 +14223,11 @@
                     </a:lnB>
                   </a:tcPr>
                 </a:tc>
+                <a:extLst>
+                  <a:ext uri="{0D108BD9-81ED-4DB2-BD59-A6C34878D82A}">
+                    <a16:rowId xmlns:a16="http://schemas.microsoft.com/office/drawing/2014/main" val="10002"/>
+                  </a:ext>
+                </a:extLst>
               </a:tr>
               <a:tr h="377450">
                 <a:tc>
@@ -14416,6 +14490,11 @@
                     </a:lnB>
                   </a:tcPr>
                 </a:tc>
+                <a:extLst>
+                  <a:ext uri="{0D108BD9-81ED-4DB2-BD59-A6C34878D82A}">
+                    <a16:rowId xmlns:a16="http://schemas.microsoft.com/office/drawing/2014/main" val="10003"/>
+                  </a:ext>
+                </a:extLst>
               </a:tr>
             </a:tbl>
           </a:graphicData>
@@ -15426,7 +15505,7 @@
               <a:buNone/>
             </a:pPr>
             <a:r>
-              <a:rPr lang="en-US" dirty="0" smtClean="0"/>
+              <a:rPr lang="en-US" dirty="0"/>
               <a:t>Train-Test Splits: How Much Time for Modeling?</a:t>
             </a:r>
             <a:endParaRPr dirty="0"/>
@@ -16061,7 +16140,7 @@
               <a:buNone/>
             </a:pPr>
             <a:r>
-              <a:rPr lang="en-US" dirty="0" smtClean="0"/>
+              <a:rPr lang="en-US" dirty="0"/>
               <a:t>Train-Test Splits: How Much Time for Modeling?</a:t>
             </a:r>
             <a:endParaRPr dirty="0"/>
@@ -17609,7 +17688,7 @@
               <a:buNone/>
             </a:pPr>
             <a:r>
-              <a:rPr lang="en-US" b="1" dirty="0" smtClean="0"/>
+              <a:rPr lang="en-US" b="1" dirty="0"/>
               <a:t>Use the freshest data:</a:t>
             </a:r>
           </a:p>
@@ -17624,7 +17703,7 @@
               <a:buNone/>
             </a:pPr>
             <a:r>
-              <a:rPr lang="en-US" dirty="0" smtClean="0"/>
+              <a:rPr lang="en-US" dirty="0"/>
               <a:t>Start from the last split and roll back</a:t>
             </a:r>
             <a:endParaRPr dirty="0"/>
@@ -18473,15 +18552,15 @@
               <a:buNone/>
             </a:pPr>
             <a:r>
-              <a:rPr lang="en-US" b="1" dirty="0" smtClean="0"/>
+              <a:rPr lang="en-US" b="1" dirty="0"/>
               <a:t>WHILE </a:t>
             </a:r>
             <a:r>
-              <a:rPr lang="en-US" dirty="0" smtClean="0"/>
+              <a:rPr lang="en-US" dirty="0"/>
               <a:t>your labels are within the labeling time, keep moving back</a:t>
             </a:r>
             <a:r>
-              <a:rPr lang="mr-IN" dirty="0" smtClean="0"/>
+              <a:rPr lang="mr-IN" dirty="0"/>
               <a:t>…</a:t>
             </a:r>
             <a:endParaRPr dirty="0"/>
@@ -19235,15 +19314,15 @@
               <a:buNone/>
             </a:pPr>
             <a:r>
-              <a:rPr lang="en-US" b="1" dirty="0" smtClean="0"/>
+              <a:rPr lang="en-US" b="1" dirty="0"/>
               <a:t>WHILE </a:t>
             </a:r>
             <a:r>
-              <a:rPr lang="en-US" dirty="0" smtClean="0"/>
+              <a:rPr lang="en-US" dirty="0"/>
               <a:t>your labels are within the labeling time, keep moving back</a:t>
             </a:r>
             <a:r>
-              <a:rPr lang="mr-IN" dirty="0" smtClean="0"/>
+              <a:rPr lang="mr-IN" dirty="0"/>
               <a:t>…</a:t>
             </a:r>
             <a:endParaRPr dirty="0"/>
@@ -19997,15 +20076,15 @@
               <a:buNone/>
             </a:pPr>
             <a:r>
-              <a:rPr lang="en-US" b="1" dirty="0" smtClean="0"/>
+              <a:rPr lang="en-US" b="1" dirty="0"/>
               <a:t>WHILE </a:t>
             </a:r>
             <a:r>
-              <a:rPr lang="en-US" dirty="0" smtClean="0"/>
+              <a:rPr lang="en-US" dirty="0"/>
               <a:t>your labels are within the labeling time, keep moving back</a:t>
             </a:r>
             <a:r>
-              <a:rPr lang="mr-IN" dirty="0" smtClean="0"/>
+              <a:rPr lang="mr-IN" dirty="0"/>
               <a:t>…</a:t>
             </a:r>
             <a:endParaRPr dirty="0"/>
@@ -20759,11 +20838,11 @@
               <a:buNone/>
             </a:pPr>
             <a:r>
-              <a:rPr lang="en-US" b="1" dirty="0" smtClean="0"/>
+              <a:rPr lang="en-US" b="1" dirty="0"/>
               <a:t>TOO FAR! </a:t>
             </a:r>
             <a:r>
-              <a:rPr lang="en-US" dirty="0" smtClean="0"/>
+              <a:rPr lang="en-US" dirty="0"/>
               <a:t>Stop making splits!</a:t>
             </a:r>
             <a:endParaRPr dirty="0"/>
@@ -20865,11 +20944,11 @@
               <a:buNone/>
             </a:pPr>
             <a:r>
-              <a:rPr lang="en-US" dirty="0" smtClean="0"/>
+              <a:rPr lang="en-US" dirty="0"/>
               <a:t>Configuring </a:t>
             </a:r>
             <a:r>
-              <a:rPr lang="en" dirty="0" smtClean="0"/>
+              <a:rPr lang="en" dirty="0"/>
               <a:t>Labels</a:t>
             </a:r>
             <a:endParaRPr dirty="0"/>
@@ -21428,11 +21507,11 @@
               <a:buNone/>
             </a:pPr>
             <a:r>
-              <a:rPr lang="en-US" dirty="0" smtClean="0"/>
+              <a:rPr lang="en-US" dirty="0"/>
               <a:t>Configuring </a:t>
             </a:r>
             <a:r>
-              <a:rPr lang="en" dirty="0" smtClean="0"/>
+              <a:rPr lang="en" dirty="0"/>
               <a:t>Labels</a:t>
             </a:r>
             <a:endParaRPr dirty="0"/>
@@ -21837,11 +21916,11 @@
               <a:buNone/>
             </a:pPr>
             <a:r>
-              <a:rPr lang="en-US" dirty="0" smtClean="0"/>
+              <a:rPr lang="en-US" dirty="0"/>
               <a:t>Configuring </a:t>
             </a:r>
             <a:r>
-              <a:rPr lang="en" dirty="0" smtClean="0"/>
+              <a:rPr lang="en" dirty="0"/>
               <a:t>Labels</a:t>
             </a:r>
             <a:endParaRPr dirty="0"/>
@@ -21891,10 +21970,34 @@
                 <a:tableStyleId>{C1756A4E-26BD-43A2-A02B-71C951CC2857}</a:tableStyleId>
               </a:tblPr>
               <a:tblGrid>
-                <a:gridCol w="1590925"/>
-                <a:gridCol w="1650750"/>
-                <a:gridCol w="2918650"/>
-                <a:gridCol w="1830175"/>
+                <a:gridCol w="1590925">
+                  <a:extLst>
+                    <a:ext uri="{9D8B030D-6E8A-4147-A177-3AD203B41FA5}">
+                      <a16:colId xmlns:a16="http://schemas.microsoft.com/office/drawing/2014/main" val="20000"/>
+                    </a:ext>
+                  </a:extLst>
+                </a:gridCol>
+                <a:gridCol w="1650750">
+                  <a:extLst>
+                    <a:ext uri="{9D8B030D-6E8A-4147-A177-3AD203B41FA5}">
+                      <a16:colId xmlns:a16="http://schemas.microsoft.com/office/drawing/2014/main" val="20001"/>
+                    </a:ext>
+                  </a:extLst>
+                </a:gridCol>
+                <a:gridCol w="2918650">
+                  <a:extLst>
+                    <a:ext uri="{9D8B030D-6E8A-4147-A177-3AD203B41FA5}">
+                      <a16:colId xmlns:a16="http://schemas.microsoft.com/office/drawing/2014/main" val="20002"/>
+                    </a:ext>
+                  </a:extLst>
+                </a:gridCol>
+                <a:gridCol w="1830175">
+                  <a:extLst>
+                    <a:ext uri="{9D8B030D-6E8A-4147-A177-3AD203B41FA5}">
+                      <a16:colId xmlns:a16="http://schemas.microsoft.com/office/drawing/2014/main" val="20003"/>
+                    </a:ext>
+                  </a:extLst>
+                </a:gridCol>
               </a:tblGrid>
               <a:tr h="377450">
                 <a:tc>
@@ -22153,6 +22256,11 @@
                     </a:lnB>
                   </a:tcPr>
                 </a:tc>
+                <a:extLst>
+                  <a:ext uri="{0D108BD9-81ED-4DB2-BD59-A6C34878D82A}">
+                    <a16:rowId xmlns:a16="http://schemas.microsoft.com/office/drawing/2014/main" val="10000"/>
+                  </a:ext>
+                </a:extLst>
               </a:tr>
               <a:tr h="377450">
                 <a:tc>
@@ -22411,6 +22519,11 @@
                     </a:lnB>
                   </a:tcPr>
                 </a:tc>
+                <a:extLst>
+                  <a:ext uri="{0D108BD9-81ED-4DB2-BD59-A6C34878D82A}">
+                    <a16:rowId xmlns:a16="http://schemas.microsoft.com/office/drawing/2014/main" val="10001"/>
+                  </a:ext>
+                </a:extLst>
               </a:tr>
               <a:tr h="377450">
                 <a:tc>
@@ -22673,6 +22786,11 @@
                     </a:lnB>
                   </a:tcPr>
                 </a:tc>
+                <a:extLst>
+                  <a:ext uri="{0D108BD9-81ED-4DB2-BD59-A6C34878D82A}">
+                    <a16:rowId xmlns:a16="http://schemas.microsoft.com/office/drawing/2014/main" val="10002"/>
+                  </a:ext>
+                </a:extLst>
               </a:tr>
               <a:tr h="377450">
                 <a:tc>
@@ -22935,6 +23053,11 @@
                     </a:lnB>
                   </a:tcPr>
                 </a:tc>
+                <a:extLst>
+                  <a:ext uri="{0D108BD9-81ED-4DB2-BD59-A6C34878D82A}">
+                    <a16:rowId xmlns:a16="http://schemas.microsoft.com/office/drawing/2014/main" val="10003"/>
+                  </a:ext>
+                </a:extLst>
               </a:tr>
             </a:tbl>
           </a:graphicData>
@@ -22958,10 +23081,34 @@
                 <a:tableStyleId>{C1756A4E-26BD-43A2-A02B-71C951CC2857}</a:tableStyleId>
               </a:tblPr>
               <a:tblGrid>
-                <a:gridCol w="1590925"/>
-                <a:gridCol w="1650750"/>
-                <a:gridCol w="2918650"/>
-                <a:gridCol w="1830175"/>
+                <a:gridCol w="1590925">
+                  <a:extLst>
+                    <a:ext uri="{9D8B030D-6E8A-4147-A177-3AD203B41FA5}">
+                      <a16:colId xmlns:a16="http://schemas.microsoft.com/office/drawing/2014/main" val="20000"/>
+                    </a:ext>
+                  </a:extLst>
+                </a:gridCol>
+                <a:gridCol w="1650750">
+                  <a:extLst>
+                    <a:ext uri="{9D8B030D-6E8A-4147-A177-3AD203B41FA5}">
+                      <a16:colId xmlns:a16="http://schemas.microsoft.com/office/drawing/2014/main" val="20001"/>
+                    </a:ext>
+                  </a:extLst>
+                </a:gridCol>
+                <a:gridCol w="2918650">
+                  <a:extLst>
+                    <a:ext uri="{9D8B030D-6E8A-4147-A177-3AD203B41FA5}">
+                      <a16:colId xmlns:a16="http://schemas.microsoft.com/office/drawing/2014/main" val="20002"/>
+                    </a:ext>
+                  </a:extLst>
+                </a:gridCol>
+                <a:gridCol w="1830175">
+                  <a:extLst>
+                    <a:ext uri="{9D8B030D-6E8A-4147-A177-3AD203B41FA5}">
+                      <a16:colId xmlns:a16="http://schemas.microsoft.com/office/drawing/2014/main" val="20003"/>
+                    </a:ext>
+                  </a:extLst>
+                </a:gridCol>
               </a:tblGrid>
               <a:tr h="377450">
                 <a:tc>
@@ -23220,6 +23367,11 @@
                     </a:lnB>
                   </a:tcPr>
                 </a:tc>
+                <a:extLst>
+                  <a:ext uri="{0D108BD9-81ED-4DB2-BD59-A6C34878D82A}">
+                    <a16:rowId xmlns:a16="http://schemas.microsoft.com/office/drawing/2014/main" val="10000"/>
+                  </a:ext>
+                </a:extLst>
               </a:tr>
               <a:tr h="377450">
                 <a:tc>
@@ -23478,6 +23630,11 @@
                     </a:lnB>
                   </a:tcPr>
                 </a:tc>
+                <a:extLst>
+                  <a:ext uri="{0D108BD9-81ED-4DB2-BD59-A6C34878D82A}">
+                    <a16:rowId xmlns:a16="http://schemas.microsoft.com/office/drawing/2014/main" val="10001"/>
+                  </a:ext>
+                </a:extLst>
               </a:tr>
               <a:tr h="377450">
                 <a:tc>
@@ -23740,6 +23897,11 @@
                     </a:lnB>
                   </a:tcPr>
                 </a:tc>
+                <a:extLst>
+                  <a:ext uri="{0D108BD9-81ED-4DB2-BD59-A6C34878D82A}">
+                    <a16:rowId xmlns:a16="http://schemas.microsoft.com/office/drawing/2014/main" val="10002"/>
+                  </a:ext>
+                </a:extLst>
               </a:tr>
               <a:tr h="377450">
                 <a:tc>
@@ -24002,6 +24164,11 @@
                     </a:lnB>
                   </a:tcPr>
                 </a:tc>
+                <a:extLst>
+                  <a:ext uri="{0D108BD9-81ED-4DB2-BD59-A6C34878D82A}">
+                    <a16:rowId xmlns:a16="http://schemas.microsoft.com/office/drawing/2014/main" val="10003"/>
+                  </a:ext>
+                </a:extLst>
               </a:tr>
             </a:tbl>
           </a:graphicData>
@@ -24151,7 +24318,7 @@
               <a:buNone/>
             </a:pPr>
             <a:r>
-              <a:rPr lang="en-US" dirty="0" smtClean="0"/>
+              <a:rPr lang="en-US" dirty="0"/>
               <a:t>How often to retrain the model?</a:t>
             </a:r>
             <a:endParaRPr dirty="0"/>
@@ -28095,16 +28262,12 @@
               <a:buNone/>
             </a:pPr>
             <a:r>
-              <a:rPr lang="en-US" dirty="0" smtClean="0"/>
+              <a:rPr lang="en-US" dirty="0"/>
               <a:t>6 months </a:t>
             </a:r>
             <a:r>
-              <a:rPr lang="en" dirty="0" smtClean="0"/>
-              <a:t>between </a:t>
-            </a:r>
-            <a:r>
               <a:rPr lang="en" dirty="0"/>
-              <a:t>training feature-label splits</a:t>
+              <a:t>between training feature-label splits</a:t>
             </a:r>
             <a:endParaRPr dirty="0"/>
           </a:p>
@@ -28170,7 +28333,7 @@
               <a:buNone/>
             </a:pPr>
             <a:r>
-              <a:rPr lang="en-US" dirty="0" smtClean="0"/>
+              <a:rPr lang="en-US" dirty="0"/>
               <a:t>How many rows to put in the matrix?</a:t>
             </a:r>
             <a:endParaRPr dirty="0"/>
@@ -28505,10 +28668,34 @@
                 <a:tableStyleId>{C1756A4E-26BD-43A2-A02B-71C951CC2857}</a:tableStyleId>
               </a:tblPr>
               <a:tblGrid>
-                <a:gridCol w="1590925"/>
-                <a:gridCol w="1650750"/>
-                <a:gridCol w="2918650"/>
-                <a:gridCol w="1830175"/>
+                <a:gridCol w="1590925">
+                  <a:extLst>
+                    <a:ext uri="{9D8B030D-6E8A-4147-A177-3AD203B41FA5}">
+                      <a16:colId xmlns:a16="http://schemas.microsoft.com/office/drawing/2014/main" val="20000"/>
+                    </a:ext>
+                  </a:extLst>
+                </a:gridCol>
+                <a:gridCol w="1650750">
+                  <a:extLst>
+                    <a:ext uri="{9D8B030D-6E8A-4147-A177-3AD203B41FA5}">
+                      <a16:colId xmlns:a16="http://schemas.microsoft.com/office/drawing/2014/main" val="20001"/>
+                    </a:ext>
+                  </a:extLst>
+                </a:gridCol>
+                <a:gridCol w="2918650">
+                  <a:extLst>
+                    <a:ext uri="{9D8B030D-6E8A-4147-A177-3AD203B41FA5}">
+                      <a16:colId xmlns:a16="http://schemas.microsoft.com/office/drawing/2014/main" val="20002"/>
+                    </a:ext>
+                  </a:extLst>
+                </a:gridCol>
+                <a:gridCol w="1830175">
+                  <a:extLst>
+                    <a:ext uri="{9D8B030D-6E8A-4147-A177-3AD203B41FA5}">
+                      <a16:colId xmlns:a16="http://schemas.microsoft.com/office/drawing/2014/main" val="20003"/>
+                    </a:ext>
+                  </a:extLst>
+                </a:gridCol>
               </a:tblGrid>
               <a:tr h="377450">
                 <a:tc>
@@ -28767,6 +28954,11 @@
                     </a:lnB>
                   </a:tcPr>
                 </a:tc>
+                <a:extLst>
+                  <a:ext uri="{0D108BD9-81ED-4DB2-BD59-A6C34878D82A}">
+                    <a16:rowId xmlns:a16="http://schemas.microsoft.com/office/drawing/2014/main" val="10000"/>
+                  </a:ext>
+                </a:extLst>
               </a:tr>
               <a:tr h="377450">
                 <a:tc>
@@ -29025,6 +29217,11 @@
                     </a:lnB>
                   </a:tcPr>
                 </a:tc>
+                <a:extLst>
+                  <a:ext uri="{0D108BD9-81ED-4DB2-BD59-A6C34878D82A}">
+                    <a16:rowId xmlns:a16="http://schemas.microsoft.com/office/drawing/2014/main" val="10001"/>
+                  </a:ext>
+                </a:extLst>
               </a:tr>
               <a:tr h="377450">
                 <a:tc>
@@ -29287,6 +29484,11 @@
                     </a:lnB>
                   </a:tcPr>
                 </a:tc>
+                <a:extLst>
+                  <a:ext uri="{0D108BD9-81ED-4DB2-BD59-A6C34878D82A}">
+                    <a16:rowId xmlns:a16="http://schemas.microsoft.com/office/drawing/2014/main" val="10002"/>
+                  </a:ext>
+                </a:extLst>
               </a:tr>
               <a:tr h="377450">
                 <a:tc>
@@ -29549,6 +29751,11 @@
                     </a:lnB>
                   </a:tcPr>
                 </a:tc>
+                <a:extLst>
+                  <a:ext uri="{0D108BD9-81ED-4DB2-BD59-A6C34878D82A}">
+                    <a16:rowId xmlns:a16="http://schemas.microsoft.com/office/drawing/2014/main" val="10003"/>
+                  </a:ext>
+                </a:extLst>
               </a:tr>
             </a:tbl>
           </a:graphicData>
@@ -29572,10 +29779,34 @@
                 <a:tableStyleId>{C1756A4E-26BD-43A2-A02B-71C951CC2857}</a:tableStyleId>
               </a:tblPr>
               <a:tblGrid>
-                <a:gridCol w="1590925"/>
-                <a:gridCol w="1650750"/>
-                <a:gridCol w="2918650"/>
-                <a:gridCol w="1830175"/>
+                <a:gridCol w="1590925">
+                  <a:extLst>
+                    <a:ext uri="{9D8B030D-6E8A-4147-A177-3AD203B41FA5}">
+                      <a16:colId xmlns:a16="http://schemas.microsoft.com/office/drawing/2014/main" val="20000"/>
+                    </a:ext>
+                  </a:extLst>
+                </a:gridCol>
+                <a:gridCol w="1650750">
+                  <a:extLst>
+                    <a:ext uri="{9D8B030D-6E8A-4147-A177-3AD203B41FA5}">
+                      <a16:colId xmlns:a16="http://schemas.microsoft.com/office/drawing/2014/main" val="20001"/>
+                    </a:ext>
+                  </a:extLst>
+                </a:gridCol>
+                <a:gridCol w="2918650">
+                  <a:extLst>
+                    <a:ext uri="{9D8B030D-6E8A-4147-A177-3AD203B41FA5}">
+                      <a16:colId xmlns:a16="http://schemas.microsoft.com/office/drawing/2014/main" val="20002"/>
+                    </a:ext>
+                  </a:extLst>
+                </a:gridCol>
+                <a:gridCol w="1830175">
+                  <a:extLst>
+                    <a:ext uri="{9D8B030D-6E8A-4147-A177-3AD203B41FA5}">
+                      <a16:colId xmlns:a16="http://schemas.microsoft.com/office/drawing/2014/main" val="20003"/>
+                    </a:ext>
+                  </a:extLst>
+                </a:gridCol>
               </a:tblGrid>
               <a:tr h="377450">
                 <a:tc>
@@ -29834,6 +30065,11 @@
                     </a:lnB>
                   </a:tcPr>
                 </a:tc>
+                <a:extLst>
+                  <a:ext uri="{0D108BD9-81ED-4DB2-BD59-A6C34878D82A}">
+                    <a16:rowId xmlns:a16="http://schemas.microsoft.com/office/drawing/2014/main" val="10000"/>
+                  </a:ext>
+                </a:extLst>
               </a:tr>
               <a:tr h="377450">
                 <a:tc>
@@ -30092,6 +30328,11 @@
                     </a:lnB>
                   </a:tcPr>
                 </a:tc>
+                <a:extLst>
+                  <a:ext uri="{0D108BD9-81ED-4DB2-BD59-A6C34878D82A}">
+                    <a16:rowId xmlns:a16="http://schemas.microsoft.com/office/drawing/2014/main" val="10001"/>
+                  </a:ext>
+                </a:extLst>
               </a:tr>
               <a:tr h="377450">
                 <a:tc>
@@ -30354,6 +30595,11 @@
                     </a:lnB>
                   </a:tcPr>
                 </a:tc>
+                <a:extLst>
+                  <a:ext uri="{0D108BD9-81ED-4DB2-BD59-A6C34878D82A}">
+                    <a16:rowId xmlns:a16="http://schemas.microsoft.com/office/drawing/2014/main" val="10002"/>
+                  </a:ext>
+                </a:extLst>
               </a:tr>
               <a:tr h="377450">
                 <a:tc>
@@ -30616,6 +30862,11 @@
                     </a:lnB>
                   </a:tcPr>
                 </a:tc>
+                <a:extLst>
+                  <a:ext uri="{0D108BD9-81ED-4DB2-BD59-A6C34878D82A}">
+                    <a16:rowId xmlns:a16="http://schemas.microsoft.com/office/drawing/2014/main" val="10003"/>
+                  </a:ext>
+                </a:extLst>
               </a:tr>
             </a:tbl>
           </a:graphicData>
@@ -30765,7 +31016,7 @@
               <a:buNone/>
             </a:pPr>
             <a:r>
-              <a:rPr lang="en-US" dirty="0" smtClean="0"/>
+              <a:rPr lang="en-US" dirty="0"/>
               <a:t>Temporal “oversampling”</a:t>
             </a:r>
             <a:endParaRPr dirty="0"/>
@@ -31280,10 +31531,34 @@
                 <a:tableStyleId>{C1756A4E-26BD-43A2-A02B-71C951CC2857}</a:tableStyleId>
               </a:tblPr>
               <a:tblGrid>
-                <a:gridCol w="1590925"/>
-                <a:gridCol w="1650750"/>
-                <a:gridCol w="2918650"/>
-                <a:gridCol w="1830175"/>
+                <a:gridCol w="1590925">
+                  <a:extLst>
+                    <a:ext uri="{9D8B030D-6E8A-4147-A177-3AD203B41FA5}">
+                      <a16:colId xmlns:a16="http://schemas.microsoft.com/office/drawing/2014/main" val="20000"/>
+                    </a:ext>
+                  </a:extLst>
+                </a:gridCol>
+                <a:gridCol w="1650750">
+                  <a:extLst>
+                    <a:ext uri="{9D8B030D-6E8A-4147-A177-3AD203B41FA5}">
+                      <a16:colId xmlns:a16="http://schemas.microsoft.com/office/drawing/2014/main" val="20001"/>
+                    </a:ext>
+                  </a:extLst>
+                </a:gridCol>
+                <a:gridCol w="2918650">
+                  <a:extLst>
+                    <a:ext uri="{9D8B030D-6E8A-4147-A177-3AD203B41FA5}">
+                      <a16:colId xmlns:a16="http://schemas.microsoft.com/office/drawing/2014/main" val="20002"/>
+                    </a:ext>
+                  </a:extLst>
+                </a:gridCol>
+                <a:gridCol w="1830175">
+                  <a:extLst>
+                    <a:ext uri="{9D8B030D-6E8A-4147-A177-3AD203B41FA5}">
+                      <a16:colId xmlns:a16="http://schemas.microsoft.com/office/drawing/2014/main" val="20003"/>
+                    </a:ext>
+                  </a:extLst>
+                </a:gridCol>
               </a:tblGrid>
               <a:tr h="377450">
                 <a:tc>
@@ -31542,6 +31817,11 @@
                     </a:lnB>
                   </a:tcPr>
                 </a:tc>
+                <a:extLst>
+                  <a:ext uri="{0D108BD9-81ED-4DB2-BD59-A6C34878D82A}">
+                    <a16:rowId xmlns:a16="http://schemas.microsoft.com/office/drawing/2014/main" val="10000"/>
+                  </a:ext>
+                </a:extLst>
               </a:tr>
               <a:tr h="377450">
                 <a:tc>
@@ -31800,6 +32080,11 @@
                     </a:lnB>
                   </a:tcPr>
                 </a:tc>
+                <a:extLst>
+                  <a:ext uri="{0D108BD9-81ED-4DB2-BD59-A6C34878D82A}">
+                    <a16:rowId xmlns:a16="http://schemas.microsoft.com/office/drawing/2014/main" val="10001"/>
+                  </a:ext>
+                </a:extLst>
               </a:tr>
               <a:tr h="377450">
                 <a:tc>
@@ -32058,6 +32343,11 @@
                     </a:lnB>
                   </a:tcPr>
                 </a:tc>
+                <a:extLst>
+                  <a:ext uri="{0D108BD9-81ED-4DB2-BD59-A6C34878D82A}">
+                    <a16:rowId xmlns:a16="http://schemas.microsoft.com/office/drawing/2014/main" val="10002"/>
+                  </a:ext>
+                </a:extLst>
               </a:tr>
               <a:tr h="377450">
                 <a:tc>
@@ -32316,6 +32606,11 @@
                     </a:lnB>
                   </a:tcPr>
                 </a:tc>
+                <a:extLst>
+                  <a:ext uri="{0D108BD9-81ED-4DB2-BD59-A6C34878D82A}">
+                    <a16:rowId xmlns:a16="http://schemas.microsoft.com/office/drawing/2014/main" val="10003"/>
+                  </a:ext>
+                </a:extLst>
               </a:tr>
               <a:tr h="377450">
                 <a:tc>
@@ -32574,6 +32869,11 @@
                     </a:lnB>
                   </a:tcPr>
                 </a:tc>
+                <a:extLst>
+                  <a:ext uri="{0D108BD9-81ED-4DB2-BD59-A6C34878D82A}">
+                    <a16:rowId xmlns:a16="http://schemas.microsoft.com/office/drawing/2014/main" val="10004"/>
+                  </a:ext>
+                </a:extLst>
               </a:tr>
               <a:tr h="377450">
                 <a:tc>
@@ -32832,6 +33132,11 @@
                     </a:lnB>
                   </a:tcPr>
                 </a:tc>
+                <a:extLst>
+                  <a:ext uri="{0D108BD9-81ED-4DB2-BD59-A6C34878D82A}">
+                    <a16:rowId xmlns:a16="http://schemas.microsoft.com/office/drawing/2014/main" val="10005"/>
+                  </a:ext>
+                </a:extLst>
               </a:tr>
               <a:tr h="377450">
                 <a:tc>
@@ -33090,6 +33395,11 @@
                     </a:lnB>
                   </a:tcPr>
                 </a:tc>
+                <a:extLst>
+                  <a:ext uri="{0D108BD9-81ED-4DB2-BD59-A6C34878D82A}">
+                    <a16:rowId xmlns:a16="http://schemas.microsoft.com/office/drawing/2014/main" val="10006"/>
+                  </a:ext>
+                </a:extLst>
               </a:tr>
               <a:tr h="377450">
                 <a:tc>
@@ -33348,6 +33658,11 @@
                     </a:lnB>
                   </a:tcPr>
                 </a:tc>
+                <a:extLst>
+                  <a:ext uri="{0D108BD9-81ED-4DB2-BD59-A6C34878D82A}">
+                    <a16:rowId xmlns:a16="http://schemas.microsoft.com/office/drawing/2014/main" val="10007"/>
+                  </a:ext>
+                </a:extLst>
               </a:tr>
               <a:tr h="377450">
                 <a:tc>
@@ -33606,6 +33921,11 @@
                     </a:lnB>
                   </a:tcPr>
                 </a:tc>
+                <a:extLst>
+                  <a:ext uri="{0D108BD9-81ED-4DB2-BD59-A6C34878D82A}">
+                    <a16:rowId xmlns:a16="http://schemas.microsoft.com/office/drawing/2014/main" val="10008"/>
+                  </a:ext>
+                </a:extLst>
               </a:tr>
               <a:tr h="377450">
                 <a:tc>
@@ -33864,6 +34184,11 @@
                     </a:lnB>
                   </a:tcPr>
                 </a:tc>
+                <a:extLst>
+                  <a:ext uri="{0D108BD9-81ED-4DB2-BD59-A6C34878D82A}">
+                    <a16:rowId xmlns:a16="http://schemas.microsoft.com/office/drawing/2014/main" val="10009"/>
+                  </a:ext>
+                </a:extLst>
               </a:tr>
             </a:tbl>
           </a:graphicData>
@@ -33972,11 +34297,7 @@
             </a:pPr>
             <a:r>
               <a:rPr lang="en" dirty="0"/>
-              <a:t>Configuring Temporal </a:t>
-            </a:r>
-            <a:r>
-              <a:rPr lang="en" dirty="0" smtClean="0"/>
-              <a:t>Parameters</a:t>
+              <a:t>Configuring Temporal Parameters</a:t>
             </a:r>
             <a:endParaRPr dirty="0"/>
           </a:p>
@@ -35335,69 +35656,69 @@
           <a:lstStyle/>
           <a:p>
             <a:r>
-              <a:rPr lang="en-US" dirty="0" err="1" smtClean="0">
+              <a:rPr lang="en-US" dirty="0" err="1">
                 <a:latin typeface="Andale Mono"/>
                 <a:cs typeface="Andale Mono"/>
               </a:rPr>
               <a:t>last_as_of_date</a:t>
             </a:r>
             <a:r>
-              <a:rPr lang="en-US" dirty="0" smtClean="0">
+              <a:rPr lang="en-US" dirty="0">
                 <a:latin typeface="Andale Mono"/>
                 <a:cs typeface="Andale Mono"/>
               </a:rPr>
               <a:t> = </a:t>
             </a:r>
             <a:r>
-              <a:rPr lang="en-US" dirty="0" err="1" smtClean="0">
+              <a:rPr lang="en-US" dirty="0" err="1">
                 <a:latin typeface="Andale Mono"/>
                 <a:cs typeface="Andale Mono"/>
               </a:rPr>
               <a:t>train_test_split_date</a:t>
             </a:r>
             <a:r>
-              <a:rPr lang="en-US" dirty="0" smtClean="0">
+              <a:rPr lang="en-US" dirty="0">
                 <a:latin typeface="Andale Mono"/>
                 <a:cs typeface="Andale Mono"/>
               </a:rPr>
               <a:t> </a:t>
             </a:r>
             <a:r>
-              <a:rPr lang="mr-IN" dirty="0" smtClean="0">
+              <a:rPr lang="mr-IN" dirty="0">
                 <a:latin typeface="Andale Mono"/>
                 <a:cs typeface="Andale Mono"/>
               </a:rPr>
               <a:t>–</a:t>
             </a:r>
             <a:r>
-              <a:rPr lang="en-US" dirty="0" smtClean="0">
+              <a:rPr lang="en-US" dirty="0">
                 <a:latin typeface="Andale Mono"/>
                 <a:cs typeface="Andale Mono"/>
               </a:rPr>
               <a:t> </a:t>
             </a:r>
             <a:r>
-              <a:rPr lang="en-US" dirty="0" err="1" smtClean="0">
+              <a:rPr lang="en-US" dirty="0" err="1">
                 <a:latin typeface="Andale Mono"/>
                 <a:cs typeface="Andale Mono"/>
               </a:rPr>
               <a:t>train_label_timespan</a:t>
             </a:r>
-            <a:endParaRPr lang="en-US" dirty="0" smtClean="0">
+            <a:endParaRPr lang="en-US" dirty="0">
               <a:latin typeface="Andale Mono"/>
               <a:cs typeface="Andale Mono"/>
             </a:endParaRPr>
           </a:p>
           <a:p>
             <a:r>
-              <a:rPr lang="en-US" dirty="0" err="1" smtClean="0">
+              <a:rPr lang="en-US" dirty="0" err="1">
                 <a:latin typeface="Andale Mono"/>
                 <a:cs typeface="Andale Mono"/>
               </a:rPr>
               <a:t>earliest_possible_as_of_date</a:t>
             </a:r>
             <a:r>
-              <a:rPr lang="en-US" dirty="0" smtClean="0">
+              <a:rPr lang="en-US" dirty="0">
                 <a:latin typeface="Andale Mono"/>
                 <a:cs typeface="Andale Mono"/>
               </a:rPr>
@@ -35418,21 +35739,21 @@
               <a:t> </a:t>
             </a:r>
             <a:r>
-              <a:rPr lang="mr-IN" dirty="0" smtClean="0">
+              <a:rPr lang="mr-IN" dirty="0">
                 <a:latin typeface="Andale Mono"/>
                 <a:cs typeface="Andale Mono"/>
               </a:rPr>
               <a:t>–</a:t>
             </a:r>
             <a:r>
-              <a:rPr lang="en-US" dirty="0" smtClean="0">
+              <a:rPr lang="en-US" dirty="0">
                 <a:latin typeface="Andale Mono"/>
                 <a:cs typeface="Andale Mono"/>
               </a:rPr>
               <a:t> </a:t>
             </a:r>
             <a:r>
-              <a:rPr lang="en-US" dirty="0" err="1" smtClean="0">
+              <a:rPr lang="en-US" dirty="0" err="1">
                 <a:solidFill>
                   <a:srgbClr val="FF0000"/>
                 </a:solidFill>
@@ -35441,7 +35762,7 @@
               </a:rPr>
               <a:t>max_training_history</a:t>
             </a:r>
-            <a:endParaRPr lang="en-US" dirty="0" smtClean="0">
+            <a:endParaRPr lang="en-US" dirty="0">
               <a:solidFill>
                 <a:srgbClr val="FF0000"/>
               </a:solidFill>
@@ -35451,14 +35772,14 @@
           </a:p>
           <a:p>
             <a:r>
-              <a:rPr lang="en-US" dirty="0" err="1" smtClean="0">
+              <a:rPr lang="en-US" dirty="0" err="1">
                 <a:latin typeface="Andale Mono"/>
                 <a:cs typeface="Andale Mono"/>
               </a:rPr>
               <a:t>as_of_dates</a:t>
             </a:r>
             <a:r>
-              <a:rPr lang="en-US" dirty="0" smtClean="0">
+              <a:rPr lang="en-US" dirty="0">
                 <a:latin typeface="Andale Mono"/>
                 <a:cs typeface="Andale Mono"/>
               </a:rPr>
@@ -35467,74 +35788,30 @@
           </a:p>
           <a:p>
             <a:r>
-              <a:rPr lang="en-US" dirty="0" err="1" smtClean="0">
+              <a:rPr lang="en-US" dirty="0" err="1">
                 <a:latin typeface="Andale Mono"/>
                 <a:cs typeface="Andale Mono"/>
               </a:rPr>
               <a:t>current_as_of_date</a:t>
             </a:r>
             <a:r>
-              <a:rPr lang="en-US" dirty="0" smtClean="0">
+              <a:rPr lang="en-US" dirty="0">
                 <a:latin typeface="Andale Mono"/>
                 <a:cs typeface="Andale Mono"/>
               </a:rPr>
               <a:t> = </a:t>
             </a:r>
             <a:r>
-              <a:rPr lang="en-US" dirty="0" err="1" smtClean="0">
+              <a:rPr lang="en-US" dirty="0" err="1">
                 <a:latin typeface="Andale Mono"/>
                 <a:cs typeface="Andale Mono"/>
               </a:rPr>
               <a:t>last_as_of_date</a:t>
             </a:r>
-            <a:endParaRPr lang="en-US" dirty="0" smtClean="0">
+            <a:endParaRPr lang="en-US" dirty="0">
               <a:latin typeface="Andale Mono"/>
               <a:cs typeface="Andale Mono"/>
             </a:endParaRPr>
-          </a:p>
-          <a:p>
-            <a:r>
-              <a:rPr lang="en-US" dirty="0" smtClean="0">
-                <a:latin typeface="Andale Mono"/>
-                <a:cs typeface="Andale Mono"/>
-              </a:rPr>
-              <a:t>WHILE </a:t>
-            </a:r>
-            <a:r>
-              <a:rPr lang="en-US" dirty="0" err="1">
-                <a:latin typeface="Andale Mono"/>
-                <a:cs typeface="Andale Mono"/>
-              </a:rPr>
-              <a:t>current_</a:t>
-            </a:r>
-            <a:r>
-              <a:rPr lang="en-US" dirty="0" err="1" smtClean="0">
-                <a:latin typeface="Andale Mono"/>
-                <a:cs typeface="Andale Mono"/>
-              </a:rPr>
-              <a:t>as_of_date</a:t>
-            </a:r>
-            <a:r>
-              <a:rPr lang="en-US" dirty="0" smtClean="0">
-                <a:latin typeface="Andale Mono"/>
-                <a:cs typeface="Andale Mono"/>
-              </a:rPr>
-              <a:t> &gt;= </a:t>
-            </a:r>
-            <a:r>
-              <a:rPr lang="en-US" dirty="0" err="1" smtClean="0">
-                <a:latin typeface="Andale Mono"/>
-                <a:cs typeface="Andale Mono"/>
-              </a:rPr>
-              <a:t>earliest_possible_as_of_date</a:t>
-            </a:r>
-            <a:r>
-              <a:rPr lang="en-US" dirty="0" smtClean="0">
-                <a:latin typeface="Andale Mono"/>
-                <a:cs typeface="Andale Mono"/>
-              </a:rPr>
-              <a:t>:</a:t>
-            </a:r>
           </a:p>
           <a:p>
             <a:r>
@@ -35542,58 +35819,7 @@
                 <a:latin typeface="Andale Mono"/>
                 <a:cs typeface="Andale Mono"/>
               </a:rPr>
-              <a:t> </a:t>
-            </a:r>
-            <a:r>
-              <a:rPr lang="en-US" dirty="0" smtClean="0">
-                <a:latin typeface="Andale Mono"/>
-                <a:cs typeface="Andale Mono"/>
-              </a:rPr>
-              <a:t>   </a:t>
-            </a:r>
-            <a:r>
-              <a:rPr lang="en-US" dirty="0" err="1" smtClean="0">
-                <a:latin typeface="Andale Mono"/>
-                <a:cs typeface="Andale Mono"/>
-              </a:rPr>
-              <a:t>as_of_dates.append</a:t>
-            </a:r>
-            <a:r>
-              <a:rPr lang="en-US" dirty="0" smtClean="0">
-                <a:latin typeface="Andale Mono"/>
-                <a:cs typeface="Andale Mono"/>
-              </a:rPr>
-              <a:t>(</a:t>
-            </a:r>
-            <a:r>
-              <a:rPr lang="en-US" dirty="0" err="1" smtClean="0">
-                <a:latin typeface="Andale Mono"/>
-                <a:cs typeface="Andale Mono"/>
-              </a:rPr>
-              <a:t>current_as_of_date</a:t>
-            </a:r>
-            <a:r>
-              <a:rPr lang="en-US" dirty="0" smtClean="0">
-                <a:latin typeface="Andale Mono"/>
-                <a:cs typeface="Andale Mono"/>
-              </a:rPr>
-              <a:t>)</a:t>
-            </a:r>
-          </a:p>
-          <a:p>
-            <a:r>
-              <a:rPr lang="en-US" dirty="0">
-                <a:latin typeface="Andale Mono"/>
-                <a:cs typeface="Andale Mono"/>
-              </a:rPr>
-              <a:t> </a:t>
-            </a:r>
-            <a:r>
-              <a:rPr lang="en-US" dirty="0" smtClean="0">
-                <a:latin typeface="Andale Mono"/>
-                <a:cs typeface="Andale Mono"/>
-              </a:rPr>
-              <a:t>   </a:t>
+              <a:t>WHILE </a:t>
             </a:r>
             <a:r>
               <a:rPr lang="en-US" dirty="0" err="1">
@@ -35607,14 +35833,44 @@
                 <a:latin typeface="Andale Mono"/>
                 <a:cs typeface="Andale Mono"/>
               </a:rPr>
-              <a:t> </a:t>
+              <a:t> &gt;= </a:t>
             </a:r>
             <a:r>
-              <a:rPr lang="en-US" dirty="0" smtClean="0">
+              <a:rPr lang="en-US" dirty="0" err="1">
                 <a:latin typeface="Andale Mono"/>
                 <a:cs typeface="Andale Mono"/>
               </a:rPr>
-              <a:t>= </a:t>
+              <a:t>earliest_possible_as_of_date</a:t>
+            </a:r>
+            <a:r>
+              <a:rPr lang="en-US" dirty="0">
+                <a:latin typeface="Andale Mono"/>
+                <a:cs typeface="Andale Mono"/>
+              </a:rPr>
+              <a:t>:</a:t>
+            </a:r>
+          </a:p>
+          <a:p>
+            <a:r>
+              <a:rPr lang="en-US" dirty="0">
+                <a:latin typeface="Andale Mono"/>
+                <a:cs typeface="Andale Mono"/>
+              </a:rPr>
+              <a:t>    </a:t>
+            </a:r>
+            <a:r>
+              <a:rPr lang="en-US" dirty="0" err="1">
+                <a:latin typeface="Andale Mono"/>
+                <a:cs typeface="Andale Mono"/>
+              </a:rPr>
+              <a:t>as_of_dates.append</a:t>
+            </a:r>
+            <a:r>
+              <a:rPr lang="en-US" dirty="0">
+                <a:latin typeface="Andale Mono"/>
+                <a:cs typeface="Andale Mono"/>
+              </a:rPr>
+              <a:t>(</a:t>
             </a:r>
             <a:r>
               <a:rPr lang="en-US" dirty="0" err="1">
@@ -35628,14 +35884,44 @@
                 <a:latin typeface="Andale Mono"/>
                 <a:cs typeface="Andale Mono"/>
               </a:rPr>
-              <a:t> </a:t>
+              <a:t>)</a:t>
             </a:r>
+          </a:p>
+          <a:p>
             <a:r>
-              <a:rPr lang="en-US" dirty="0" smtClean="0">
+              <a:rPr lang="en-US" dirty="0">
                 <a:latin typeface="Andale Mono"/>
                 <a:cs typeface="Andale Mono"/>
               </a:rPr>
-              <a:t>- </a:t>
+              <a:t>    </a:t>
+            </a:r>
+            <a:r>
+              <a:rPr lang="en-US" dirty="0" err="1">
+                <a:latin typeface="Andale Mono"/>
+                <a:cs typeface="Andale Mono"/>
+              </a:rPr>
+              <a:t>current_as_of_date</a:t>
+            </a:r>
+            <a:r>
+              <a:rPr lang="en-US" dirty="0">
+                <a:latin typeface="Andale Mono"/>
+                <a:cs typeface="Andale Mono"/>
+              </a:rPr>
+              <a:t> = </a:t>
+            </a:r>
+            <a:r>
+              <a:rPr lang="en-US" dirty="0" err="1">
+                <a:latin typeface="Andale Mono"/>
+                <a:cs typeface="Andale Mono"/>
+              </a:rPr>
+              <a:t>current_as_of_date</a:t>
+            </a:r>
+            <a:r>
+              <a:rPr lang="en-US" dirty="0">
+                <a:latin typeface="Andale Mono"/>
+                <a:cs typeface="Andale Mono"/>
+              </a:rPr>
+              <a:t> - </a:t>
             </a:r>
             <a:r>
               <a:rPr lang="en-US" dirty="0" err="1">
@@ -35726,11 +36012,7 @@
             </a:pPr>
             <a:r>
               <a:rPr lang="en" dirty="0"/>
-              <a:t>Configuring Temporal </a:t>
-            </a:r>
-            <a:r>
-              <a:rPr lang="en" dirty="0" smtClean="0"/>
-              <a:t>Parameters</a:t>
+              <a:t>Configuring Temporal Parameters</a:t>
             </a:r>
             <a:endParaRPr dirty="0"/>
           </a:p>
@@ -37418,7 +37700,7 @@
           <a:lstStyle/>
           <a:p>
             <a:r>
-              <a:rPr lang="en-US" dirty="0" smtClean="0">
+              <a:rPr lang="en-US" dirty="0">
                 <a:solidFill>
                   <a:schemeClr val="dk1"/>
                 </a:solidFill>
@@ -37426,7 +37708,7 @@
               <a:t>Same loop, but roll </a:t>
             </a:r>
             <a:r>
-              <a:rPr lang="en-US" b="1" dirty="0" smtClean="0">
+              <a:rPr lang="en-US" b="1" dirty="0">
                 <a:solidFill>
                   <a:schemeClr val="dk1"/>
                 </a:solidFill>
@@ -37434,7 +37716,7 @@
               <a:t>forward</a:t>
             </a:r>
             <a:r>
-              <a:rPr lang="en-US" dirty="0" smtClean="0">
+              <a:rPr lang="en-US" dirty="0">
                 <a:solidFill>
                   <a:schemeClr val="dk1"/>
                 </a:solidFill>
@@ -37442,7 +37724,7 @@
               <a:t> this time, and don’t forget to </a:t>
             </a:r>
             <a:r>
-              <a:rPr lang="en-US" b="1" dirty="0" smtClean="0">
+              <a:rPr lang="en-US" b="1" dirty="0">
                 <a:solidFill>
                   <a:schemeClr val="dk1"/>
                 </a:solidFill>
@@ -37554,10 +37836,34 @@
                 <a:tableStyleId>{C1756A4E-26BD-43A2-A02B-71C951CC2857}</a:tableStyleId>
               </a:tblPr>
               <a:tblGrid>
-                <a:gridCol w="1590925"/>
-                <a:gridCol w="1650750"/>
-                <a:gridCol w="2918650"/>
-                <a:gridCol w="1830175"/>
+                <a:gridCol w="1590925">
+                  <a:extLst>
+                    <a:ext uri="{9D8B030D-6E8A-4147-A177-3AD203B41FA5}">
+                      <a16:colId xmlns:a16="http://schemas.microsoft.com/office/drawing/2014/main" val="20000"/>
+                    </a:ext>
+                  </a:extLst>
+                </a:gridCol>
+                <a:gridCol w="1650750">
+                  <a:extLst>
+                    <a:ext uri="{9D8B030D-6E8A-4147-A177-3AD203B41FA5}">
+                      <a16:colId xmlns:a16="http://schemas.microsoft.com/office/drawing/2014/main" val="20001"/>
+                    </a:ext>
+                  </a:extLst>
+                </a:gridCol>
+                <a:gridCol w="2918650">
+                  <a:extLst>
+                    <a:ext uri="{9D8B030D-6E8A-4147-A177-3AD203B41FA5}">
+                      <a16:colId xmlns:a16="http://schemas.microsoft.com/office/drawing/2014/main" val="20002"/>
+                    </a:ext>
+                  </a:extLst>
+                </a:gridCol>
+                <a:gridCol w="1830175">
+                  <a:extLst>
+                    <a:ext uri="{9D8B030D-6E8A-4147-A177-3AD203B41FA5}">
+                      <a16:colId xmlns:a16="http://schemas.microsoft.com/office/drawing/2014/main" val="20003"/>
+                    </a:ext>
+                  </a:extLst>
+                </a:gridCol>
               </a:tblGrid>
               <a:tr h="377450">
                 <a:tc>
@@ -37816,6 +38122,11 @@
                     </a:lnB>
                   </a:tcPr>
                 </a:tc>
+                <a:extLst>
+                  <a:ext uri="{0D108BD9-81ED-4DB2-BD59-A6C34878D82A}">
+                    <a16:rowId xmlns:a16="http://schemas.microsoft.com/office/drawing/2014/main" val="10000"/>
+                  </a:ext>
+                </a:extLst>
               </a:tr>
               <a:tr h="377450">
                 <a:tc>
@@ -38074,6 +38385,11 @@
                     </a:lnB>
                   </a:tcPr>
                 </a:tc>
+                <a:extLst>
+                  <a:ext uri="{0D108BD9-81ED-4DB2-BD59-A6C34878D82A}">
+                    <a16:rowId xmlns:a16="http://schemas.microsoft.com/office/drawing/2014/main" val="10001"/>
+                  </a:ext>
+                </a:extLst>
               </a:tr>
               <a:tr h="377450">
                 <a:tc>
@@ -38332,6 +38648,11 @@
                     </a:lnB>
                   </a:tcPr>
                 </a:tc>
+                <a:extLst>
+                  <a:ext uri="{0D108BD9-81ED-4DB2-BD59-A6C34878D82A}">
+                    <a16:rowId xmlns:a16="http://schemas.microsoft.com/office/drawing/2014/main" val="10002"/>
+                  </a:ext>
+                </a:extLst>
               </a:tr>
               <a:tr h="377450">
                 <a:tc>
@@ -38590,6 +38911,11 @@
                     </a:lnB>
                   </a:tcPr>
                 </a:tc>
+                <a:extLst>
+                  <a:ext uri="{0D108BD9-81ED-4DB2-BD59-A6C34878D82A}">
+                    <a16:rowId xmlns:a16="http://schemas.microsoft.com/office/drawing/2014/main" val="10003"/>
+                  </a:ext>
+                </a:extLst>
               </a:tr>
               <a:tr h="377450">
                 <a:tc>
@@ -38848,6 +39174,11 @@
                     </a:lnB>
                   </a:tcPr>
                 </a:tc>
+                <a:extLst>
+                  <a:ext uri="{0D108BD9-81ED-4DB2-BD59-A6C34878D82A}">
+                    <a16:rowId xmlns:a16="http://schemas.microsoft.com/office/drawing/2014/main" val="10004"/>
+                  </a:ext>
+                </a:extLst>
               </a:tr>
               <a:tr h="377450">
                 <a:tc>
@@ -39106,6 +39437,11 @@
                     </a:lnB>
                   </a:tcPr>
                 </a:tc>
+                <a:extLst>
+                  <a:ext uri="{0D108BD9-81ED-4DB2-BD59-A6C34878D82A}">
+                    <a16:rowId xmlns:a16="http://schemas.microsoft.com/office/drawing/2014/main" val="10005"/>
+                  </a:ext>
+                </a:extLst>
               </a:tr>
               <a:tr h="377450">
                 <a:tc>
@@ -39364,6 +39700,11 @@
                     </a:lnB>
                   </a:tcPr>
                 </a:tc>
+                <a:extLst>
+                  <a:ext uri="{0D108BD9-81ED-4DB2-BD59-A6C34878D82A}">
+                    <a16:rowId xmlns:a16="http://schemas.microsoft.com/office/drawing/2014/main" val="10006"/>
+                  </a:ext>
+                </a:extLst>
               </a:tr>
               <a:tr h="377450">
                 <a:tc>
@@ -39622,6 +39963,11 @@
                     </a:lnB>
                   </a:tcPr>
                 </a:tc>
+                <a:extLst>
+                  <a:ext uri="{0D108BD9-81ED-4DB2-BD59-A6C34878D82A}">
+                    <a16:rowId xmlns:a16="http://schemas.microsoft.com/office/drawing/2014/main" val="10007"/>
+                  </a:ext>
+                </a:extLst>
               </a:tr>
               <a:tr h="377450">
                 <a:tc>
@@ -39880,6 +40226,11 @@
                     </a:lnB>
                   </a:tcPr>
                 </a:tc>
+                <a:extLst>
+                  <a:ext uri="{0D108BD9-81ED-4DB2-BD59-A6C34878D82A}">
+                    <a16:rowId xmlns:a16="http://schemas.microsoft.com/office/drawing/2014/main" val="10008"/>
+                  </a:ext>
+                </a:extLst>
               </a:tr>
               <a:tr h="377450">
                 <a:tc>
@@ -40138,6 +40489,11 @@
                     </a:lnB>
                   </a:tcPr>
                 </a:tc>
+                <a:extLst>
+                  <a:ext uri="{0D108BD9-81ED-4DB2-BD59-A6C34878D82A}">
+                    <a16:rowId xmlns:a16="http://schemas.microsoft.com/office/drawing/2014/main" val="10009"/>
+                  </a:ext>
+                </a:extLst>
               </a:tr>
             </a:tbl>
           </a:graphicData>
@@ -40323,13 +40679,9 @@
             </a:pPr>
             <a:r>
               <a:rPr lang="en" dirty="0"/>
-              <a:t>Theoretically reduces variance in error </a:t>
+              <a:t>Theoretically reduces variance in error predictions</a:t>
             </a:r>
-            <a:r>
-              <a:rPr lang="en" dirty="0" smtClean="0"/>
-              <a:t>predictions</a:t>
-            </a:r>
-            <a:endParaRPr lang="en-US" dirty="0" smtClean="0"/>
+            <a:endParaRPr lang="en-US" dirty="0"/>
           </a:p>
           <a:p>
             <a:pPr marL="457200" lvl="0" indent="-342900" rtl="0">
@@ -40343,11 +40695,11 @@
               <a:buChar char="-"/>
             </a:pPr>
             <a:r>
-              <a:rPr lang="en-US" dirty="0" smtClean="0"/>
+              <a:rPr lang="en-US" dirty="0"/>
               <a:t>Labels and features are </a:t>
             </a:r>
             <a:r>
-              <a:rPr lang="en-US" b="1" dirty="0" smtClean="0"/>
+              <a:rPr lang="en-US" b="1" dirty="0"/>
               <a:t>static properties</a:t>
             </a:r>
             <a:endParaRPr b="1" dirty="0"/>
@@ -40442,13 +40794,9 @@
             </a:pPr>
             <a:r>
               <a:rPr lang="en" dirty="0"/>
-              <a:t>Theoretically reduces bias in error predictions on out of sample </a:t>
+              <a:t>Theoretically reduces bias in error predictions on out of sample data</a:t>
             </a:r>
-            <a:r>
-              <a:rPr lang="en" dirty="0" smtClean="0"/>
-              <a:t>data</a:t>
-            </a:r>
-            <a:endParaRPr lang="en-US" dirty="0" smtClean="0"/>
+            <a:endParaRPr lang="en-US" dirty="0"/>
           </a:p>
           <a:p>
             <a:pPr marL="457200" lvl="0" indent="-342900" rtl="0">
@@ -40462,11 +40810,11 @@
               <a:buChar char="-"/>
             </a:pPr>
             <a:r>
-              <a:rPr lang="en-US" dirty="0" smtClean="0"/>
+              <a:rPr lang="en-US" dirty="0"/>
               <a:t>Labels and features are </a:t>
             </a:r>
             <a:r>
-              <a:rPr lang="en-US" b="1" dirty="0" smtClean="0"/>
+              <a:rPr lang="en-US" b="1" dirty="0"/>
               <a:t>aggregations over timespans</a:t>
             </a:r>
             <a:endParaRPr dirty="0"/>
@@ -40533,11 +40881,11 @@
               <a:buNone/>
             </a:pPr>
             <a:r>
-              <a:rPr lang="en-US" dirty="0" smtClean="0"/>
+              <a:rPr lang="en-US" dirty="0"/>
               <a:t>All the </a:t>
             </a:r>
             <a:r>
-              <a:rPr lang="en" dirty="0" smtClean="0"/>
+              <a:rPr lang="en" dirty="0"/>
               <a:t>Temporal Parameters</a:t>
             </a:r>
             <a:endParaRPr dirty="0"/>
@@ -41147,7 +41495,7 @@
               <a:t>: </a:t>
             </a:r>
             <a:r>
-              <a:rPr lang="en-US" sz="1200" dirty="0" smtClean="0">
+              <a:rPr lang="en-US" sz="1200" dirty="0">
                 <a:solidFill>
                   <a:srgbClr val="24292E"/>
                 </a:solidFill>
@@ -41162,7 +41510,7 @@
               <a:t>[</a:t>
             </a:r>
             <a:r>
-              <a:rPr lang="en" sz="1200" dirty="0" smtClean="0">
+              <a:rPr lang="en" sz="1200" dirty="0">
                 <a:solidFill>
                   <a:srgbClr val="032F62"/>
                 </a:solidFill>
@@ -41177,7 +41525,7 @@
               <a:t>'6month’</a:t>
             </a:r>
             <a:r>
-              <a:rPr lang="en-US" sz="1200" dirty="0" smtClean="0">
+              <a:rPr lang="en-US" sz="1200" dirty="0">
                 <a:solidFill>
                   <a:srgbClr val="032F62"/>
                 </a:solidFill>
@@ -41192,7 +41540,7 @@
               <a:t>]</a:t>
             </a:r>
             <a:r>
-              <a:rPr lang="en" sz="1200" dirty="0" smtClean="0">
+              <a:rPr lang="en" sz="1200" dirty="0">
                 <a:solidFill>
                   <a:srgbClr val="24292E"/>
                 </a:solidFill>
@@ -41293,7 +41641,7 @@
               <a:t>: </a:t>
             </a:r>
             <a:r>
-              <a:rPr lang="en-US" sz="1200" dirty="0" smtClean="0">
+              <a:rPr lang="en-US" sz="1200" dirty="0">
                 <a:solidFill>
                   <a:srgbClr val="24292E"/>
                 </a:solidFill>
@@ -41308,7 +41656,7 @@
               <a:t>[</a:t>
             </a:r>
             <a:r>
-              <a:rPr lang="en" sz="1200" dirty="0" smtClean="0">
+              <a:rPr lang="en" sz="1200" dirty="0">
                 <a:solidFill>
                   <a:srgbClr val="032F62"/>
                 </a:solidFill>
@@ -41323,7 +41671,7 @@
               <a:t>'1day’</a:t>
             </a:r>
             <a:r>
-              <a:rPr lang="en-US" sz="1200" dirty="0" smtClean="0">
+              <a:rPr lang="en-US" sz="1200" dirty="0">
                 <a:solidFill>
                   <a:srgbClr val="032F62"/>
                 </a:solidFill>
@@ -41338,7 +41686,7 @@
               <a:t>]</a:t>
             </a:r>
             <a:r>
-              <a:rPr lang="en" sz="1200" dirty="0" smtClean="0">
+              <a:rPr lang="en" sz="1200" dirty="0">
                 <a:solidFill>
                   <a:srgbClr val="24292E"/>
                 </a:solidFill>
@@ -41439,7 +41787,7 @@
               <a:t>: </a:t>
             </a:r>
             <a:r>
-              <a:rPr lang="en-US" sz="1200" dirty="0" smtClean="0">
+              <a:rPr lang="en-US" sz="1200" dirty="0">
                 <a:solidFill>
                   <a:srgbClr val="24292E"/>
                 </a:solidFill>
@@ -41454,7 +41802,7 @@
               <a:t>[</a:t>
             </a:r>
             <a:r>
-              <a:rPr lang="en" sz="1200" dirty="0" smtClean="0">
+              <a:rPr lang="en" sz="1200" dirty="0">
                 <a:solidFill>
                   <a:srgbClr val="032F62"/>
                 </a:solidFill>
@@ -41469,7 +41817,7 @@
               <a:t>'3month’</a:t>
             </a:r>
             <a:r>
-              <a:rPr lang="en-US" sz="1200" dirty="0" smtClean="0">
+              <a:rPr lang="en-US" sz="1200" dirty="0">
                 <a:solidFill>
                   <a:srgbClr val="032F62"/>
                 </a:solidFill>
@@ -41484,7 +41832,7 @@
               <a:t>]</a:t>
             </a:r>
             <a:r>
-              <a:rPr lang="en" sz="1200" dirty="0" smtClean="0">
+              <a:rPr lang="en" sz="1200" dirty="0">
                 <a:solidFill>
                   <a:srgbClr val="24292E"/>
                 </a:solidFill>
@@ -41985,10 +42333,9 @@
           <a:lstStyle/>
           <a:p>
             <a:r>
-              <a:rPr lang="en-US" dirty="0" smtClean="0"/>
+              <a:rPr lang="en-US" dirty="0"/>
               <a:t>General Structure</a:t>
             </a:r>
-            <a:endParaRPr lang="en-US" dirty="0"/>
           </a:p>
         </p:txBody>
       </p:sp>
@@ -42008,18 +42355,18 @@
           <a:lstStyle/>
           <a:p>
             <a:r>
-              <a:rPr lang="en-US" b="1" dirty="0" smtClean="0"/>
+              <a:rPr lang="en-US" b="1" dirty="0"/>
               <a:t>Outer loop: </a:t>
             </a:r>
             <a:r>
-              <a:rPr lang="en-US" dirty="0" smtClean="0"/>
+              <a:rPr lang="en-US" dirty="0"/>
               <a:t>Find train-test split dates within label and feature time</a:t>
             </a:r>
           </a:p>
           <a:p>
             <a:pPr lvl="1"/>
             <a:r>
-              <a:rPr lang="en-US" dirty="0" smtClean="0"/>
+              <a:rPr lang="en-US" dirty="0"/>
               <a:t>Roll backwards from last possible split to use your freshest data</a:t>
             </a:r>
           </a:p>
@@ -42027,29 +42374,29 @@
             <a:pPr marL="596900" lvl="1" indent="0">
               <a:buNone/>
             </a:pPr>
-            <a:endParaRPr lang="en-US" dirty="0" smtClean="0"/>
+            <a:endParaRPr lang="en-US" dirty="0"/>
           </a:p>
           <a:p>
             <a:r>
-              <a:rPr lang="en-US" b="1" dirty="0" smtClean="0"/>
+              <a:rPr lang="en-US" b="1" dirty="0"/>
               <a:t>Inner loops:</a:t>
             </a:r>
             <a:r>
-              <a:rPr lang="en-US" dirty="0" smtClean="0"/>
+              <a:rPr lang="en-US" dirty="0"/>
               <a:t> Find feature-label split dates (as-of-dates) with the matrix duration</a:t>
             </a:r>
           </a:p>
           <a:p>
             <a:pPr lvl="1"/>
             <a:r>
-              <a:rPr lang="en-US" dirty="0" smtClean="0"/>
+              <a:rPr lang="en-US" dirty="0"/>
               <a:t>Train matrices: roll backward from the latest possible as-of-date</a:t>
             </a:r>
           </a:p>
           <a:p>
             <a:pPr lvl="1"/>
             <a:r>
-              <a:rPr lang="en-US" dirty="0" smtClean="0"/>
+              <a:rPr lang="en-US" dirty="0"/>
               <a:t>Test matrices: roll forward from the train-test split date</a:t>
             </a:r>
           </a:p>
@@ -42121,8 +42468,8 @@
               <a:buChar char="-"/>
             </a:pPr>
             <a:r>
-              <a:rPr lang="en-US" dirty="0" smtClean="0"/>
-              <a:t>ALWAYS USE &gt;= AND &lt;</a:t>
+              <a:rPr lang="en-US" dirty="0"/>
+              <a:t>ALWAYS USE &gt;= AND &lt; (never “between”)</a:t>
             </a:r>
             <a:endParaRPr dirty="0"/>
           </a:p>
@@ -42138,15 +42485,15 @@
               <a:buChar char="-"/>
             </a:pPr>
             <a:r>
-              <a:rPr lang="en-US" dirty="0" smtClean="0"/>
+              <a:rPr lang="en-US" dirty="0"/>
               <a:t>Test your temporal code: Start with a simple configuration where </a:t>
             </a:r>
             <a:r>
-              <a:rPr lang="en-US" b="1" dirty="0" smtClean="0"/>
+              <a:rPr lang="en-US" b="1" dirty="0"/>
               <a:t>you can write out the expected results</a:t>
             </a:r>
             <a:r>
-              <a:rPr lang="en-US" dirty="0" smtClean="0"/>
+              <a:rPr lang="en-US" dirty="0"/>
               <a:t> without code, and make sure your code produces the right dates</a:t>
             </a:r>
           </a:p>
@@ -42162,7 +42509,7 @@
               <a:buChar char="-"/>
             </a:pPr>
             <a:r>
-              <a:rPr lang="en-US" dirty="0" smtClean="0"/>
+              <a:rPr lang="en-US" dirty="0"/>
               <a:t>Test your feature code: Start with a few people and a few features that you made up, calculate the expected matrices by hand and check them against the matrices your code makes</a:t>
             </a:r>
             <a:endParaRPr dirty="0"/>
@@ -42217,7 +42564,7 @@
               <a:buNone/>
             </a:pPr>
             <a:r>
-              <a:rPr lang="en-US" dirty="0" smtClean="0"/>
+              <a:rPr lang="en-US" dirty="0"/>
               <a:t>Warnings</a:t>
             </a:r>
             <a:endParaRPr dirty="0"/>
@@ -42285,7 +42632,7 @@
               <a:buNone/>
             </a:pPr>
             <a:r>
-              <a:rPr lang="en-US" dirty="0" smtClean="0"/>
+              <a:rPr lang="en-US" dirty="0"/>
               <a:t>Obvious:</a:t>
             </a:r>
           </a:p>
@@ -42301,7 +42648,7 @@
               <a:buChar char="-"/>
             </a:pPr>
             <a:r>
-              <a:rPr lang="en-US" dirty="0" smtClean="0"/>
+              <a:rPr lang="en-US" dirty="0"/>
               <a:t>Train and test labels aggregate data from overlapping times</a:t>
             </a:r>
           </a:p>
@@ -42317,7 +42664,7 @@
               <a:buChar char="-"/>
             </a:pPr>
             <a:r>
-              <a:rPr lang="en-US" dirty="0" smtClean="0"/>
+              <a:rPr lang="en-US" dirty="0"/>
               <a:t>Labels and features aggregate data from overlapping times</a:t>
             </a:r>
           </a:p>
@@ -42332,7 +42679,7 @@
               <a:buSzPts val="1800"/>
               <a:buChar char="-"/>
             </a:pPr>
-            <a:endParaRPr lang="en-US" dirty="0" smtClean="0"/>
+            <a:endParaRPr lang="en-US" dirty="0"/>
           </a:p>
           <a:p>
             <a:pPr marL="114300" lvl="0" indent="0" rtl="0">
@@ -42346,7 +42693,7 @@
               <a:buNone/>
             </a:pPr>
             <a:r>
-              <a:rPr lang="en-US" dirty="0" smtClean="0"/>
+              <a:rPr lang="en-US" dirty="0"/>
               <a:t>Less obvious:</a:t>
             </a:r>
           </a:p>
@@ -42356,7 +42703,7 @@
               <a:buChar char="-"/>
             </a:pPr>
             <a:r>
-              <a:rPr lang="en-US" dirty="0" smtClean="0"/>
+              <a:rPr lang="en-US" dirty="0"/>
               <a:t>Cohorts: People not known in the data until later are included in earlier models</a:t>
             </a:r>
           </a:p>
@@ -42365,7 +42712,7 @@
               <a:buFontTx/>
               <a:buChar char="-"/>
             </a:pPr>
-            <a:endParaRPr lang="en-US" dirty="0" smtClean="0"/>
+            <a:endParaRPr lang="en-US" dirty="0"/>
           </a:p>
           <a:p>
             <a:pPr>
@@ -42411,7 +42758,7 @@
               <a:buNone/>
             </a:pPr>
             <a:r>
-              <a:rPr lang="en-US" dirty="0" smtClean="0"/>
+              <a:rPr lang="en-US" dirty="0"/>
               <a:t>Sources of Temporal Leakage</a:t>
             </a:r>
             <a:endParaRPr dirty="0"/>
@@ -42483,7 +42830,7 @@
               <a:buNone/>
             </a:pPr>
             <a:r>
-              <a:rPr lang="en-US" dirty="0" smtClean="0"/>
+              <a:rPr lang="en-US" dirty="0"/>
               <a:t>Temporal Model Evaluation</a:t>
             </a:r>
             <a:endParaRPr dirty="0"/>
@@ -42796,10 +43143,9 @@
           <a:lstStyle/>
           <a:p>
             <a:r>
-              <a:rPr lang="en-US" dirty="0" smtClean="0"/>
+              <a:rPr lang="en-US" dirty="0"/>
               <a:t>Implementing Temporal Cross Validation</a:t>
             </a:r>
-            <a:endParaRPr lang="en-US" dirty="0"/>
           </a:p>
         </p:txBody>
       </p:sp>
@@ -42819,14 +43165,14 @@
           <a:lstStyle/>
           <a:p>
             <a:r>
-              <a:rPr lang="en-US" dirty="0" smtClean="0"/>
+              <a:rPr lang="en-US" dirty="0"/>
               <a:t>A series of loops with complicated logic </a:t>
             </a:r>
             <a:r>
-              <a:rPr lang="mr-IN" dirty="0" smtClean="0"/>
+              <a:rPr lang="mr-IN" dirty="0"/>
               <a:t>…</a:t>
             </a:r>
-            <a:endParaRPr lang="en-US" dirty="0" smtClean="0"/>
+            <a:endParaRPr lang="en-US" dirty="0"/>
           </a:p>
         </p:txBody>
       </p:sp>
@@ -42896,11 +43242,7 @@
             </a:pPr>
             <a:r>
               <a:rPr lang="en" dirty="0"/>
-              <a:t>Implementing Temporal Cross </a:t>
-            </a:r>
-            <a:r>
-              <a:rPr lang="en" dirty="0" smtClean="0"/>
-              <a:t>Validation</a:t>
+              <a:t>Implementing Temporal Cross Validation</a:t>
             </a:r>
             <a:endParaRPr dirty="0"/>
           </a:p>
@@ -42998,7 +43340,7 @@
               <a:t>only incorporate information </a:t>
             </a:r>
             <a:r>
-              <a:rPr lang="en" sz="2000" b="1" dirty="0" smtClean="0">
+              <a:rPr lang="en" sz="2000" b="1" dirty="0">
                 <a:solidFill>
                   <a:schemeClr val="dk1"/>
                 </a:solidFill>
@@ -43006,7 +43348,7 @@
               <a:t>before</a:t>
             </a:r>
             <a:r>
-              <a:rPr lang="en-US" sz="2000" b="1" dirty="0" smtClean="0">
+              <a:rPr lang="en-US" sz="2000" b="1" dirty="0">
                 <a:solidFill>
                   <a:schemeClr val="dk1"/>
                 </a:solidFill>
@@ -43014,20 +43356,12 @@
               <a:t> (&lt;)</a:t>
             </a:r>
             <a:r>
-              <a:rPr lang="en" sz="2000" dirty="0" smtClean="0">
-                <a:solidFill>
-                  <a:schemeClr val="dk1"/>
-                </a:solidFill>
-              </a:rPr>
-              <a:t> </a:t>
-            </a:r>
-            <a:r>
               <a:rPr lang="en" sz="2000" dirty="0">
                 <a:solidFill>
                   <a:schemeClr val="dk1"/>
                 </a:solidFill>
               </a:rPr>
-              <a:t>that timestamp</a:t>
+              <a:t> that timestamp</a:t>
             </a:r>
             <a:endParaRPr sz="2000" dirty="0">
               <a:solidFill>
@@ -43095,18 +43429,10 @@
                   <a:schemeClr val="dk1"/>
                 </a:solidFill>
               </a:rPr>
-              <a:t>at or </a:t>
+              <a:t>at or later</a:t>
             </a:r>
             <a:r>
-              <a:rPr lang="en" sz="2000" b="1" dirty="0" smtClean="0">
-                <a:solidFill>
-                  <a:schemeClr val="dk1"/>
-                </a:solidFill>
-              </a:rPr>
-              <a:t>later</a:t>
-            </a:r>
-            <a:r>
-              <a:rPr lang="en-US" sz="2000" b="1" dirty="0" smtClean="0">
+              <a:rPr lang="en-US" sz="2000" b="1" dirty="0">
                 <a:solidFill>
                   <a:schemeClr val="dk1"/>
                 </a:solidFill>
@@ -43114,7 +43440,7 @@
               <a:t> (&gt;=)</a:t>
             </a:r>
             <a:r>
-              <a:rPr lang="en" sz="2000" b="1" dirty="0" smtClean="0">
+              <a:rPr lang="en" sz="2000" b="1" dirty="0">
                 <a:solidFill>
                   <a:schemeClr val="dk1"/>
                 </a:solidFill>
@@ -43300,11 +43626,7 @@
             </a:pPr>
             <a:r>
               <a:rPr lang="en" dirty="0"/>
-              <a:t>Implementing Temporal Cross </a:t>
-            </a:r>
-            <a:r>
-              <a:rPr lang="en" dirty="0" smtClean="0"/>
-              <a:t>Validation</a:t>
+              <a:t>Implementing Temporal Cross Validation</a:t>
             </a:r>
             <a:endParaRPr dirty="0"/>
           </a:p>
@@ -43639,10 +43961,34 @@
                 <a:tableStyleId>{C1756A4E-26BD-43A2-A02B-71C951CC2857}</a:tableStyleId>
               </a:tblPr>
               <a:tblGrid>
-                <a:gridCol w="1590925"/>
-                <a:gridCol w="1650750"/>
-                <a:gridCol w="2918650"/>
-                <a:gridCol w="1830175"/>
+                <a:gridCol w="1590925">
+                  <a:extLst>
+                    <a:ext uri="{9D8B030D-6E8A-4147-A177-3AD203B41FA5}">
+                      <a16:colId xmlns:a16="http://schemas.microsoft.com/office/drawing/2014/main" val="20000"/>
+                    </a:ext>
+                  </a:extLst>
+                </a:gridCol>
+                <a:gridCol w="1650750">
+                  <a:extLst>
+                    <a:ext uri="{9D8B030D-6E8A-4147-A177-3AD203B41FA5}">
+                      <a16:colId xmlns:a16="http://schemas.microsoft.com/office/drawing/2014/main" val="20001"/>
+                    </a:ext>
+                  </a:extLst>
+                </a:gridCol>
+                <a:gridCol w="2918650">
+                  <a:extLst>
+                    <a:ext uri="{9D8B030D-6E8A-4147-A177-3AD203B41FA5}">
+                      <a16:colId xmlns:a16="http://schemas.microsoft.com/office/drawing/2014/main" val="20002"/>
+                    </a:ext>
+                  </a:extLst>
+                </a:gridCol>
+                <a:gridCol w="1830175">
+                  <a:extLst>
+                    <a:ext uri="{9D8B030D-6E8A-4147-A177-3AD203B41FA5}">
+                      <a16:colId xmlns:a16="http://schemas.microsoft.com/office/drawing/2014/main" val="20003"/>
+                    </a:ext>
+                  </a:extLst>
+                </a:gridCol>
               </a:tblGrid>
               <a:tr h="377450">
                 <a:tc>
@@ -43901,6 +44247,11 @@
                     </a:lnB>
                   </a:tcPr>
                 </a:tc>
+                <a:extLst>
+                  <a:ext uri="{0D108BD9-81ED-4DB2-BD59-A6C34878D82A}">
+                    <a16:rowId xmlns:a16="http://schemas.microsoft.com/office/drawing/2014/main" val="10000"/>
+                  </a:ext>
+                </a:extLst>
               </a:tr>
               <a:tr h="377450">
                 <a:tc>
@@ -44159,6 +44510,11 @@
                     </a:lnB>
                   </a:tcPr>
                 </a:tc>
+                <a:extLst>
+                  <a:ext uri="{0D108BD9-81ED-4DB2-BD59-A6C34878D82A}">
+                    <a16:rowId xmlns:a16="http://schemas.microsoft.com/office/drawing/2014/main" val="10001"/>
+                  </a:ext>
+                </a:extLst>
               </a:tr>
               <a:tr h="377450">
                 <a:tc>
@@ -44426,6 +44782,11 @@
                     </a:lnB>
                   </a:tcPr>
                 </a:tc>
+                <a:extLst>
+                  <a:ext uri="{0D108BD9-81ED-4DB2-BD59-A6C34878D82A}">
+                    <a16:rowId xmlns:a16="http://schemas.microsoft.com/office/drawing/2014/main" val="10002"/>
+                  </a:ext>
+                </a:extLst>
               </a:tr>
               <a:tr h="377450">
                 <a:tc>
@@ -44693,6 +45054,11 @@
                     </a:lnB>
                   </a:tcPr>
                 </a:tc>
+                <a:extLst>
+                  <a:ext uri="{0D108BD9-81ED-4DB2-BD59-A6C34878D82A}">
+                    <a16:rowId xmlns:a16="http://schemas.microsoft.com/office/drawing/2014/main" val="10003"/>
+                  </a:ext>
+                </a:extLst>
               </a:tr>
             </a:tbl>
           </a:graphicData>
@@ -44767,10 +45133,34 @@
                 <a:tableStyleId>{C1756A4E-26BD-43A2-A02B-71C951CC2857}</a:tableStyleId>
               </a:tblPr>
               <a:tblGrid>
-                <a:gridCol w="1590925"/>
-                <a:gridCol w="1650750"/>
-                <a:gridCol w="2918650"/>
-                <a:gridCol w="1830175"/>
+                <a:gridCol w="1590925">
+                  <a:extLst>
+                    <a:ext uri="{9D8B030D-6E8A-4147-A177-3AD203B41FA5}">
+                      <a16:colId xmlns:a16="http://schemas.microsoft.com/office/drawing/2014/main" val="20000"/>
+                    </a:ext>
+                  </a:extLst>
+                </a:gridCol>
+                <a:gridCol w="1650750">
+                  <a:extLst>
+                    <a:ext uri="{9D8B030D-6E8A-4147-A177-3AD203B41FA5}">
+                      <a16:colId xmlns:a16="http://schemas.microsoft.com/office/drawing/2014/main" val="20001"/>
+                    </a:ext>
+                  </a:extLst>
+                </a:gridCol>
+                <a:gridCol w="2918650">
+                  <a:extLst>
+                    <a:ext uri="{9D8B030D-6E8A-4147-A177-3AD203B41FA5}">
+                      <a16:colId xmlns:a16="http://schemas.microsoft.com/office/drawing/2014/main" val="20002"/>
+                    </a:ext>
+                  </a:extLst>
+                </a:gridCol>
+                <a:gridCol w="1830175">
+                  <a:extLst>
+                    <a:ext uri="{9D8B030D-6E8A-4147-A177-3AD203B41FA5}">
+                      <a16:colId xmlns:a16="http://schemas.microsoft.com/office/drawing/2014/main" val="20003"/>
+                    </a:ext>
+                  </a:extLst>
+                </a:gridCol>
               </a:tblGrid>
               <a:tr h="377450">
                 <a:tc>
@@ -45029,6 +45419,11 @@
                     </a:lnB>
                   </a:tcPr>
                 </a:tc>
+                <a:extLst>
+                  <a:ext uri="{0D108BD9-81ED-4DB2-BD59-A6C34878D82A}">
+                    <a16:rowId xmlns:a16="http://schemas.microsoft.com/office/drawing/2014/main" val="10000"/>
+                  </a:ext>
+                </a:extLst>
               </a:tr>
               <a:tr h="377450">
                 <a:tc>
@@ -45287,6 +45682,11 @@
                     </a:lnB>
                   </a:tcPr>
                 </a:tc>
+                <a:extLst>
+                  <a:ext uri="{0D108BD9-81ED-4DB2-BD59-A6C34878D82A}">
+                    <a16:rowId xmlns:a16="http://schemas.microsoft.com/office/drawing/2014/main" val="10001"/>
+                  </a:ext>
+                </a:extLst>
               </a:tr>
               <a:tr h="377450">
                 <a:tc>
@@ -45554,6 +45954,11 @@
                     </a:lnB>
                   </a:tcPr>
                 </a:tc>
+                <a:extLst>
+                  <a:ext uri="{0D108BD9-81ED-4DB2-BD59-A6C34878D82A}">
+                    <a16:rowId xmlns:a16="http://schemas.microsoft.com/office/drawing/2014/main" val="10002"/>
+                  </a:ext>
+                </a:extLst>
               </a:tr>
               <a:tr h="377450">
                 <a:tc>
@@ -45821,6 +46226,11 @@
                     </a:lnB>
                   </a:tcPr>
                 </a:tc>
+                <a:extLst>
+                  <a:ext uri="{0D108BD9-81ED-4DB2-BD59-A6C34878D82A}">
+                    <a16:rowId xmlns:a16="http://schemas.microsoft.com/office/drawing/2014/main" val="10003"/>
+                  </a:ext>
+                </a:extLst>
               </a:tr>
             </a:tbl>
           </a:graphicData>
@@ -45849,7 +46259,7 @@
           <a:lstStyle/>
           <a:p>
             <a:r>
-              <a:rPr lang="en-US" dirty="0" smtClean="0">
+              <a:rPr lang="en-US" dirty="0">
                 <a:solidFill>
                   <a:srgbClr val="FF0000"/>
                 </a:solidFill>
@@ -45859,14 +46269,14 @@
               <a:t>SELECT</a:t>
             </a:r>
             <a:r>
-              <a:rPr lang="en-US" dirty="0" smtClean="0">
+              <a:rPr lang="en-US" dirty="0">
                 <a:latin typeface="Andale Mono"/>
                 <a:cs typeface="Andale Mono"/>
               </a:rPr>
               <a:t> </a:t>
             </a:r>
             <a:r>
-              <a:rPr lang="en-US" dirty="0" smtClean="0">
+              <a:rPr lang="en-US" dirty="0">
                 <a:solidFill>
                   <a:srgbClr val="3366FF"/>
                 </a:solidFill>
@@ -45876,7 +46286,7 @@
               <a:t>count</a:t>
             </a:r>
             <a:r>
-              <a:rPr lang="en-US" dirty="0" smtClean="0">
+              <a:rPr lang="en-US" dirty="0">
                 <a:latin typeface="Andale Mono"/>
                 <a:cs typeface="Andale Mono"/>
               </a:rPr>
@@ -45885,14 +46295,14 @@
           </a:p>
           <a:p>
             <a:r>
-              <a:rPr lang="en-US" dirty="0" smtClean="0">
+              <a:rPr lang="en-US" dirty="0">
                 <a:latin typeface="Andale Mono"/>
                 <a:cs typeface="Andale Mono"/>
               </a:rPr>
               <a:t>  </a:t>
             </a:r>
             <a:r>
-              <a:rPr lang="en-US" dirty="0" smtClean="0">
+              <a:rPr lang="en-US" dirty="0">
                 <a:solidFill>
                   <a:srgbClr val="FF0000"/>
                 </a:solidFill>
@@ -45902,7 +46312,7 @@
               <a:t>FROM</a:t>
             </a:r>
             <a:r>
-              <a:rPr lang="en-US" dirty="0" smtClean="0">
+              <a:rPr lang="en-US" dirty="0">
                 <a:latin typeface="Andale Mono"/>
                 <a:cs typeface="Andale Mono"/>
               </a:rPr>
@@ -45911,14 +46321,14 @@
           </a:p>
           <a:p>
             <a:r>
-              <a:rPr lang="en-US" dirty="0" smtClean="0">
+              <a:rPr lang="en-US" dirty="0">
                 <a:latin typeface="Andale Mono"/>
                 <a:cs typeface="Andale Mono"/>
               </a:rPr>
               <a:t> </a:t>
             </a:r>
             <a:r>
-              <a:rPr lang="en-US" dirty="0" smtClean="0">
+              <a:rPr lang="en-US" dirty="0">
                 <a:solidFill>
                   <a:srgbClr val="FF0000"/>
                 </a:solidFill>
@@ -45928,21 +46338,21 @@
               <a:t>WHERE</a:t>
             </a:r>
             <a:r>
-              <a:rPr lang="en-US" dirty="0" smtClean="0">
+              <a:rPr lang="en-US" dirty="0">
                 <a:latin typeface="Andale Mono"/>
                 <a:cs typeface="Andale Mono"/>
               </a:rPr>
               <a:t> </a:t>
             </a:r>
             <a:r>
-              <a:rPr lang="en-US" dirty="0" err="1" smtClean="0">
+              <a:rPr lang="en-US" dirty="0" err="1">
                 <a:latin typeface="Andale Mono"/>
                 <a:cs typeface="Andale Mono"/>
               </a:rPr>
               <a:t>event_type</a:t>
             </a:r>
             <a:r>
-              <a:rPr lang="en-US" dirty="0" smtClean="0">
+              <a:rPr lang="en-US" dirty="0">
                 <a:latin typeface="Andale Mono"/>
                 <a:cs typeface="Andale Mono"/>
               </a:rPr>
@@ -45951,14 +46361,14 @@
           </a:p>
           <a:p>
             <a:r>
-              <a:rPr lang="en-US" dirty="0" smtClean="0">
+              <a:rPr lang="en-US" dirty="0">
                 <a:latin typeface="Andale Mono"/>
                 <a:cs typeface="Andale Mono"/>
               </a:rPr>
               <a:t>   </a:t>
             </a:r>
             <a:r>
-              <a:rPr lang="en-US" dirty="0" smtClean="0">
+              <a:rPr lang="en-US" dirty="0">
                 <a:solidFill>
                   <a:srgbClr val="FF0000"/>
                 </a:solidFill>
@@ -45968,21 +46378,21 @@
               <a:t>AND</a:t>
             </a:r>
             <a:r>
-              <a:rPr lang="en-US" dirty="0" smtClean="0">
+              <a:rPr lang="en-US" dirty="0">
                 <a:latin typeface="Andale Mono"/>
                 <a:cs typeface="Andale Mono"/>
               </a:rPr>
               <a:t> </a:t>
             </a:r>
             <a:r>
-              <a:rPr lang="en-US" dirty="0" err="1" smtClean="0">
+              <a:rPr lang="en-US" dirty="0" err="1">
                 <a:latin typeface="Andale Mono"/>
                 <a:cs typeface="Andale Mono"/>
               </a:rPr>
               <a:t>event_date</a:t>
             </a:r>
             <a:r>
-              <a:rPr lang="en-US" dirty="0" smtClean="0">
+              <a:rPr lang="en-US" dirty="0">
                 <a:latin typeface="Andale Mono"/>
                 <a:cs typeface="Andale Mono"/>
               </a:rPr>
@@ -45995,17 +46405,10 @@
                 <a:latin typeface="Andale Mono"/>
                 <a:cs typeface="Andale Mono"/>
               </a:rPr>
-              <a:t> </a:t>
+              <a:t>   </a:t>
             </a:r>
             <a:r>
-              <a:rPr lang="en-US" dirty="0" smtClean="0">
-                <a:latin typeface="Andale Mono"/>
-                <a:cs typeface="Andale Mono"/>
-              </a:rPr>
-              <a:t>  </a:t>
-            </a:r>
-            <a:r>
-              <a:rPr lang="en-US" dirty="0" smtClean="0">
+              <a:rPr lang="en-US" dirty="0">
                 <a:solidFill>
                   <a:srgbClr val="FF0000"/>
                 </a:solidFill>
@@ -46015,42 +46418,42 @@
               <a:t>AND</a:t>
             </a:r>
             <a:r>
-              <a:rPr lang="en-US" dirty="0" smtClean="0">
+              <a:rPr lang="en-US" dirty="0">
                 <a:latin typeface="Andale Mono"/>
                 <a:cs typeface="Andale Mono"/>
               </a:rPr>
               <a:t> </a:t>
             </a:r>
             <a:r>
-              <a:rPr lang="en-US" dirty="0" err="1" smtClean="0">
+              <a:rPr lang="en-US" dirty="0" err="1">
                 <a:latin typeface="Andale Mono"/>
                 <a:cs typeface="Andale Mono"/>
               </a:rPr>
               <a:t>event_date</a:t>
             </a:r>
             <a:r>
-              <a:rPr lang="en-US" dirty="0" smtClean="0">
+              <a:rPr lang="en-US" dirty="0">
                 <a:latin typeface="Andale Mono"/>
                 <a:cs typeface="Andale Mono"/>
               </a:rPr>
               <a:t> &gt;= (‘2012-01-01 </a:t>
             </a:r>
             <a:r>
-              <a:rPr lang="mr-IN" dirty="0" smtClean="0">
+              <a:rPr lang="mr-IN" dirty="0">
                 <a:latin typeface="Andale Mono"/>
                 <a:cs typeface="Andale Mono"/>
               </a:rPr>
               <a:t>–</a:t>
             </a:r>
             <a:r>
-              <a:rPr lang="en-US" dirty="0" smtClean="0">
+              <a:rPr lang="en-US" dirty="0">
                 <a:latin typeface="Andale Mono"/>
                 <a:cs typeface="Andale Mono"/>
               </a:rPr>
               <a:t> </a:t>
             </a:r>
             <a:r>
-              <a:rPr lang="en-US" dirty="0" smtClean="0">
+              <a:rPr lang="en-US" dirty="0">
                 <a:solidFill>
                   <a:srgbClr val="3366FF"/>
                 </a:solidFill>
@@ -46060,16 +46463,12 @@
               <a:t>INTERVAL</a:t>
             </a:r>
             <a:r>
-              <a:rPr lang="en-US" dirty="0" smtClean="0">
+              <a:rPr lang="en-US" dirty="0">
                 <a:latin typeface="Andale Mono"/>
                 <a:cs typeface="Andale Mono"/>
               </a:rPr>
               <a:t> ‘4 years’)</a:t>
             </a:r>
-            <a:endParaRPr lang="en-US" dirty="0">
-              <a:latin typeface="Andale Mono"/>
-              <a:cs typeface="Andale Mono"/>
-            </a:endParaRPr>
           </a:p>
         </p:txBody>
       </p:sp>

</xml_diff>